<commit_message>
updated trie figure pptx
</commit_message>
<xml_diff>
--- a/paper/trie_figure.pptx
+++ b/paper/trie_figure.pptx
@@ -7,6 +7,7 @@
   <p:sldIdLst>
     <p:sldId id="256" r:id="rId2"/>
     <p:sldId id="257" r:id="rId3"/>
+    <p:sldId id="258" r:id="rId4"/>
   </p:sldIdLst>
   <p:sldSz cx="9144000" cy="6858000" type="screen4x3"/>
   <p:notesSz cx="6858000" cy="9144000"/>
@@ -3060,18 +3061,55 @@
           <a:chExt cx="0" cy="0"/>
         </a:xfrm>
       </p:grpSpPr>
+      <p:cxnSp>
+        <p:nvCxnSpPr>
+          <p:cNvPr id="44" name="Straight Connector 43"/>
+          <p:cNvCxnSpPr>
+            <a:stCxn id="6" idx="4"/>
+          </p:cNvCxnSpPr>
+          <p:nvPr/>
+        </p:nvCxnSpPr>
+        <p:spPr>
+          <a:xfrm>
+            <a:off x="1853009" y="3605981"/>
+            <a:ext cx="0" cy="2871019"/>
+          </a:xfrm>
+          <a:prstGeom prst="line">
+            <a:avLst/>
+          </a:prstGeom>
+          <a:ln w="28575">
+            <a:solidFill>
+              <a:schemeClr val="tx1"/>
+            </a:solidFill>
+          </a:ln>
+        </p:spPr>
+        <p:style>
+          <a:lnRef idx="1">
+            <a:schemeClr val="accent1"/>
+          </a:lnRef>
+          <a:fillRef idx="0">
+            <a:schemeClr val="accent1"/>
+          </a:fillRef>
+          <a:effectRef idx="0">
+            <a:schemeClr val="accent1"/>
+          </a:effectRef>
+          <a:fontRef idx="minor">
+            <a:schemeClr val="tx1"/>
+          </a:fontRef>
+        </p:style>
+      </p:cxnSp>
       <p:grpSp>
         <p:nvGrpSpPr>
-          <p:cNvPr id="79" name="Group 78"/>
+          <p:cNvPr id="2" name="Group 78"/>
           <p:cNvGrpSpPr/>
           <p:nvPr/>
         </p:nvGrpSpPr>
         <p:grpSpPr>
           <a:xfrm>
-            <a:off x="0" y="76200"/>
-            <a:ext cx="9144000" cy="6553200"/>
-            <a:chOff x="533400" y="-838200"/>
-            <a:chExt cx="9530082" cy="7086600"/>
+            <a:off x="685800" y="76200"/>
+            <a:ext cx="7535537" cy="6517968"/>
+            <a:chOff x="1248154" y="-838200"/>
+            <a:chExt cx="7853712" cy="7048500"/>
           </a:xfrm>
         </p:grpSpPr>
         <p:cxnSp>
@@ -3082,8 +3120,8 @@
           </p:nvCxnSpPr>
           <p:spPr>
             <a:xfrm flipH="1">
-              <a:off x="3886200" y="1981200"/>
-              <a:ext cx="990600" cy="1905000"/>
+              <a:off x="4027762" y="1981200"/>
+              <a:ext cx="849038" cy="723900"/>
             </a:xfrm>
             <a:prstGeom prst="line">
               <a:avLst/>
@@ -3117,8 +3155,8 @@
           </p:nvCxnSpPr>
           <p:spPr>
             <a:xfrm>
-              <a:off x="3886200" y="3810000"/>
-              <a:ext cx="0" cy="2209800"/>
+              <a:off x="4136503" y="2705100"/>
+              <a:ext cx="0" cy="3314700"/>
             </a:xfrm>
             <a:prstGeom prst="line">
               <a:avLst/>
@@ -3147,13 +3185,15 @@
         <p:cxnSp>
           <p:nvCxnSpPr>
             <p:cNvPr id="73" name="Straight Connector 72"/>
-            <p:cNvCxnSpPr/>
+            <p:cNvCxnSpPr>
+              <a:stCxn id="4" idx="5"/>
+            </p:cNvCxnSpPr>
             <p:nvPr/>
           </p:nvCxnSpPr>
           <p:spPr>
             <a:xfrm>
-              <a:off x="4953000" y="1981200"/>
-              <a:ext cx="2590800" cy="2362200"/>
+              <a:off x="4623966" y="1042567"/>
+              <a:ext cx="1389230" cy="1580131"/>
             </a:xfrm>
             <a:prstGeom prst="line">
               <a:avLst/>
@@ -3257,8 +3297,8 @@
           </p:nvCxnSpPr>
           <p:spPr>
             <a:xfrm flipH="1">
-              <a:off x="1219200" y="1066800"/>
-              <a:ext cx="2971800" cy="4648200"/>
+              <a:off x="2439416" y="1066800"/>
+              <a:ext cx="1751585" cy="1555898"/>
             </a:xfrm>
             <a:prstGeom prst="line">
               <a:avLst/>
@@ -3342,7 +3382,7 @@
           </p:nvSpPr>
           <p:spPr>
             <a:xfrm>
-              <a:off x="3352800" y="1600200"/>
+              <a:off x="2995338" y="1469065"/>
               <a:ext cx="685800" cy="685800"/>
             </a:xfrm>
             <a:prstGeom prst="ellipse">
@@ -3397,7 +3437,7 @@
           </p:nvSpPr>
           <p:spPr>
             <a:xfrm>
-              <a:off x="2743200" y="2590800"/>
+              <a:off x="2121747" y="2293088"/>
               <a:ext cx="685800" cy="685800"/>
             </a:xfrm>
             <a:prstGeom prst="ellipse">
@@ -3452,7 +3492,7 @@
           </p:nvSpPr>
           <p:spPr>
             <a:xfrm>
-              <a:off x="1524000" y="4495800"/>
+              <a:off x="2150701" y="4542761"/>
               <a:ext cx="685800" cy="685800"/>
             </a:xfrm>
             <a:prstGeom prst="ellipse">
@@ -3507,7 +3547,7 @@
           </p:nvSpPr>
           <p:spPr>
             <a:xfrm>
-              <a:off x="2057400" y="3505200"/>
+              <a:off x="2150701" y="3475961"/>
               <a:ext cx="685800" cy="685800"/>
             </a:xfrm>
             <a:prstGeom prst="ellipse">
@@ -3562,7 +3602,7 @@
           </p:nvSpPr>
           <p:spPr>
             <a:xfrm>
-              <a:off x="838200" y="5486400"/>
+              <a:off x="2150701" y="5524500"/>
               <a:ext cx="685800" cy="685800"/>
             </a:xfrm>
             <a:prstGeom prst="ellipse">
@@ -3617,7 +3657,7 @@
           </p:nvSpPr>
           <p:spPr>
             <a:xfrm>
-              <a:off x="4572000" y="1600200"/>
+              <a:off x="4742517" y="1469065"/>
               <a:ext cx="685800" cy="685800"/>
             </a:xfrm>
             <a:prstGeom prst="ellipse">
@@ -3677,7 +3717,7 @@
           </p:nvSpPr>
           <p:spPr>
             <a:xfrm>
-              <a:off x="4038600" y="2590800"/>
+              <a:off x="3789510" y="2293088"/>
               <a:ext cx="685800" cy="685800"/>
             </a:xfrm>
             <a:prstGeom prst="ellipse">
@@ -3737,7 +3777,7 @@
           </p:nvSpPr>
           <p:spPr>
             <a:xfrm>
-              <a:off x="3505200" y="3505200"/>
+              <a:off x="3818466" y="3475961"/>
               <a:ext cx="685800" cy="685800"/>
             </a:xfrm>
             <a:prstGeom prst="ellipse">
@@ -3797,7 +3837,7 @@
           </p:nvSpPr>
           <p:spPr>
             <a:xfrm>
-              <a:off x="3505200" y="5562600"/>
+              <a:off x="3818466" y="5524500"/>
               <a:ext cx="685800" cy="685800"/>
             </a:xfrm>
             <a:prstGeom prst="ellipse">
@@ -3852,7 +3892,7 @@
           </p:nvSpPr>
           <p:spPr>
             <a:xfrm>
-              <a:off x="3505200" y="4572000"/>
+              <a:off x="3818466" y="4542761"/>
               <a:ext cx="685800" cy="685800"/>
             </a:xfrm>
             <a:prstGeom prst="ellipse">
@@ -3912,7 +3952,7 @@
           </p:nvSpPr>
           <p:spPr>
             <a:xfrm>
-              <a:off x="5029200" y="4800600"/>
+              <a:off x="5029198" y="4542761"/>
               <a:ext cx="685800" cy="685800"/>
             </a:xfrm>
             <a:prstGeom prst="ellipse">
@@ -3967,7 +4007,7 @@
           </p:nvSpPr>
           <p:spPr>
             <a:xfrm>
-              <a:off x="5029200" y="3657600"/>
+              <a:off x="5029198" y="3475961"/>
               <a:ext cx="685800" cy="685800"/>
             </a:xfrm>
             <a:prstGeom prst="ellipse">
@@ -4022,7 +4062,7 @@
           </p:nvSpPr>
           <p:spPr>
             <a:xfrm>
-              <a:off x="5486400" y="2438400"/>
+              <a:off x="5645065" y="2293088"/>
               <a:ext cx="685800" cy="685800"/>
             </a:xfrm>
             <a:prstGeom prst="ellipse">
@@ -4071,116 +4111,6 @@
                   <a:schemeClr val="tx1"/>
                 </a:solidFill>
               </a:endParaRPr>
-            </a:p>
-          </p:txBody>
-        </p:sp>
-        <p:sp>
-          <p:nvSpPr>
-            <p:cNvPr id="24" name="Oval 23"/>
-            <p:cNvSpPr/>
-            <p:nvPr/>
-          </p:nvSpPr>
-          <p:spPr>
-            <a:xfrm>
-              <a:off x="7239000" y="3962400"/>
-              <a:ext cx="685800" cy="685800"/>
-            </a:xfrm>
-            <a:prstGeom prst="ellipse">
-              <a:avLst/>
-            </a:prstGeom>
-            <a:solidFill>
-              <a:schemeClr val="bg1"/>
-            </a:solidFill>
-            <a:ln>
-              <a:solidFill>
-                <a:schemeClr val="tx1"/>
-              </a:solidFill>
-            </a:ln>
-          </p:spPr>
-          <p:style>
-            <a:lnRef idx="2">
-              <a:schemeClr val="accent1">
-                <a:shade val="50000"/>
-              </a:schemeClr>
-            </a:lnRef>
-            <a:fillRef idx="1">
-              <a:schemeClr val="accent1"/>
-            </a:fillRef>
-            <a:effectRef idx="0">
-              <a:schemeClr val="accent1"/>
-            </a:effectRef>
-            <a:fontRef idx="minor">
-              <a:schemeClr val="lt1"/>
-            </a:fontRef>
-          </p:style>
-          <p:txBody>
-            <a:bodyPr rtlCol="0" anchor="ctr"/>
-            <a:lstStyle/>
-            <a:p>
-              <a:pPr algn="ctr"/>
-              <a:r>
-                <a:rPr lang="en-US" sz="3600" dirty="0">
-                  <a:solidFill>
-                    <a:schemeClr val="tx1"/>
-                  </a:solidFill>
-                </a:rPr>
-                <a:t>t</a:t>
-              </a:r>
-            </a:p>
-          </p:txBody>
-        </p:sp>
-        <p:sp>
-          <p:nvSpPr>
-            <p:cNvPr id="25" name="Oval 24"/>
-            <p:cNvSpPr/>
-            <p:nvPr/>
-          </p:nvSpPr>
-          <p:spPr>
-            <a:xfrm>
-              <a:off x="6352736" y="3200400"/>
-              <a:ext cx="685800" cy="685800"/>
-            </a:xfrm>
-            <a:prstGeom prst="ellipse">
-              <a:avLst/>
-            </a:prstGeom>
-            <a:solidFill>
-              <a:schemeClr val="bg1"/>
-            </a:solidFill>
-            <a:ln>
-              <a:solidFill>
-                <a:schemeClr val="tx1"/>
-              </a:solidFill>
-            </a:ln>
-          </p:spPr>
-          <p:style>
-            <a:lnRef idx="2">
-              <a:schemeClr val="accent1">
-                <a:shade val="50000"/>
-              </a:schemeClr>
-            </a:lnRef>
-            <a:fillRef idx="1">
-              <a:schemeClr val="accent1"/>
-            </a:fillRef>
-            <a:effectRef idx="0">
-              <a:schemeClr val="accent1"/>
-            </a:effectRef>
-            <a:fontRef idx="minor">
-              <a:schemeClr val="lt1"/>
-            </a:fontRef>
-          </p:style>
-          <p:txBody>
-            <a:bodyPr rtlCol="0" anchor="ctr"/>
-            <a:lstStyle/>
-            <a:p>
-              <a:pPr algn="ctr"/>
-              <a:r>
-                <a:rPr lang="en-US" sz="3600" dirty="0">
-                  <a:solidFill>
-                    <a:schemeClr val="tx1"/>
-                  </a:solidFill>
-                </a:rPr>
-                <a:t>x</a:t>
-              </a:r>
             </a:p>
           </p:txBody>
         </p:sp>
@@ -4283,8 +4213,8 @@
           </p:nvSpPr>
           <p:spPr>
             <a:xfrm>
-              <a:off x="1590035" y="780871"/>
-              <a:ext cx="1838965" cy="1200329"/>
+              <a:off x="1248154" y="515943"/>
+              <a:ext cx="1838966" cy="1200329"/>
             </a:xfrm>
             <a:prstGeom prst="rect">
               <a:avLst/>
@@ -4374,8 +4304,8 @@
           </p:nvSpPr>
           <p:spPr>
             <a:xfrm>
-              <a:off x="5338377" y="914400"/>
-              <a:ext cx="2114681" cy="1200329"/>
+              <a:off x="5486861" y="727444"/>
+              <a:ext cx="2114682" cy="1200329"/>
             </a:xfrm>
             <a:prstGeom prst="rect">
               <a:avLst/>
@@ -4465,8 +4395,8 @@
           </p:nvSpPr>
           <p:spPr>
             <a:xfrm>
-              <a:off x="8086659" y="3505200"/>
-              <a:ext cx="1976823" cy="1200329"/>
+              <a:off x="7125042" y="4471254"/>
+              <a:ext cx="1976824" cy="1200329"/>
             </a:xfrm>
             <a:prstGeom prst="rect">
               <a:avLst/>
@@ -4556,7 +4486,7 @@
           </p:nvSpPr>
           <p:spPr>
             <a:xfrm>
-              <a:off x="2420676" y="2667000"/>
+              <a:off x="1752598" y="2418170"/>
               <a:ext cx="322524" cy="369332"/>
             </a:xfrm>
             <a:prstGeom prst="rect">
@@ -4592,7 +4522,7 @@
           </p:nvSpPr>
           <p:spPr>
             <a:xfrm>
-              <a:off x="1752600" y="3593068"/>
+              <a:off x="1752598" y="3571803"/>
               <a:ext cx="322524" cy="369332"/>
             </a:xfrm>
             <a:prstGeom prst="rect">
@@ -4628,7 +4558,7 @@
           </p:nvSpPr>
           <p:spPr>
             <a:xfrm>
-              <a:off x="1143000" y="4431268"/>
+              <a:off x="1752598" y="4598213"/>
               <a:ext cx="322524" cy="369332"/>
             </a:xfrm>
             <a:prstGeom prst="rect">
@@ -4660,7 +4590,7 @@
           </p:nvSpPr>
           <p:spPr>
             <a:xfrm>
-              <a:off x="533400" y="5345668"/>
+              <a:off x="1752598" y="5631861"/>
               <a:ext cx="322524" cy="369332"/>
             </a:xfrm>
             <a:prstGeom prst="rect">
@@ -4692,7 +4622,7 @@
           </p:nvSpPr>
           <p:spPr>
             <a:xfrm>
-              <a:off x="4706676" y="2678668"/>
+              <a:off x="4484959" y="2418170"/>
               <a:ext cx="322524" cy="369332"/>
             </a:xfrm>
             <a:prstGeom prst="rect">
@@ -4724,7 +4654,7 @@
           </p:nvSpPr>
           <p:spPr>
             <a:xfrm>
-              <a:off x="4191000" y="3657600"/>
+              <a:off x="4484959" y="3571803"/>
               <a:ext cx="322524" cy="369332"/>
             </a:xfrm>
             <a:prstGeom prst="rect">
@@ -4756,7 +4686,7 @@
           </p:nvSpPr>
           <p:spPr>
             <a:xfrm>
-              <a:off x="4173276" y="4724400"/>
+              <a:off x="4484959" y="4598213"/>
               <a:ext cx="322524" cy="369332"/>
             </a:xfrm>
             <a:prstGeom prst="rect">
@@ -4788,7 +4718,7 @@
           </p:nvSpPr>
           <p:spPr>
             <a:xfrm>
-              <a:off x="4173276" y="5650468"/>
+              <a:off x="4484959" y="5631861"/>
               <a:ext cx="460382" cy="369332"/>
             </a:xfrm>
             <a:prstGeom prst="rect">
@@ -4824,7 +4754,7 @@
           </p:nvSpPr>
           <p:spPr>
             <a:xfrm>
-              <a:off x="6169018" y="2514600"/>
+              <a:off x="6346991" y="2418170"/>
               <a:ext cx="460382" cy="369332"/>
             </a:xfrm>
             <a:prstGeom prst="rect">
@@ -4860,7 +4790,7 @@
           </p:nvSpPr>
           <p:spPr>
             <a:xfrm>
-              <a:off x="5697750" y="3821668"/>
+              <a:off x="5697751" y="3571803"/>
               <a:ext cx="460382" cy="369332"/>
             </a:xfrm>
             <a:prstGeom prst="rect">
@@ -4896,7 +4826,7 @@
           </p:nvSpPr>
           <p:spPr>
             <a:xfrm>
-              <a:off x="5715000" y="4964668"/>
+              <a:off x="5697751" y="4598213"/>
               <a:ext cx="460382" cy="369332"/>
             </a:xfrm>
             <a:prstGeom prst="rect">
@@ -4932,7 +4862,7 @@
           </p:nvSpPr>
           <p:spPr>
             <a:xfrm>
-              <a:off x="7007218" y="3276600"/>
+              <a:off x="7007220" y="3571803"/>
               <a:ext cx="460382" cy="369332"/>
             </a:xfrm>
             <a:prstGeom prst="rect">
@@ -4960,45 +4890,192 @@
             </a:p>
           </p:txBody>
         </p:sp>
-        <p:cxnSp>
-          <p:nvCxnSpPr>
-            <p:cNvPr id="64" name="Straight Connector 63"/>
-            <p:cNvCxnSpPr>
-              <a:stCxn id="4" idx="5"/>
-              <a:endCxn id="12" idx="0"/>
-            </p:cNvCxnSpPr>
-            <p:nvPr/>
-          </p:nvCxnSpPr>
-          <p:spPr>
-            <a:xfrm>
-              <a:off x="4623967" y="1042567"/>
-              <a:ext cx="290933" cy="557633"/>
-            </a:xfrm>
-            <a:prstGeom prst="line">
-              <a:avLst/>
-            </a:prstGeom>
-            <a:ln w="28575">
+      </p:grpSp>
+      <p:cxnSp>
+        <p:nvCxnSpPr>
+          <p:cNvPr id="51" name="Straight Connector 50"/>
+          <p:cNvCxnSpPr/>
+          <p:nvPr/>
+        </p:nvCxnSpPr>
+        <p:spPr>
+          <a:xfrm>
+            <a:off x="5517270" y="3462996"/>
+            <a:ext cx="438678" cy="1127432"/>
+          </a:xfrm>
+          <a:prstGeom prst="line">
+            <a:avLst/>
+          </a:prstGeom>
+          <a:ln w="28575">
+            <a:solidFill>
+              <a:schemeClr val="tx1"/>
+            </a:solidFill>
+          </a:ln>
+        </p:spPr>
+        <p:style>
+          <a:lnRef idx="1">
+            <a:schemeClr val="accent1"/>
+          </a:lnRef>
+          <a:fillRef idx="0">
+            <a:schemeClr val="accent1"/>
+          </a:fillRef>
+          <a:effectRef idx="0">
+            <a:schemeClr val="accent1"/>
+          </a:effectRef>
+          <a:fontRef idx="minor">
+            <a:schemeClr val="tx1"/>
+          </a:fontRef>
+        </p:style>
+      </p:cxnSp>
+      <p:cxnSp>
+        <p:nvCxnSpPr>
+          <p:cNvPr id="53" name="Straight Connector 52"/>
+          <p:cNvCxnSpPr/>
+          <p:nvPr/>
+        </p:nvCxnSpPr>
+        <p:spPr>
+          <a:xfrm flipH="1">
+            <a:off x="5955948" y="4590428"/>
+            <a:ext cx="0" cy="1056968"/>
+          </a:xfrm>
+          <a:prstGeom prst="line">
+            <a:avLst/>
+          </a:prstGeom>
+          <a:ln w="28575">
+            <a:solidFill>
+              <a:schemeClr val="tx1"/>
+            </a:solidFill>
+          </a:ln>
+        </p:spPr>
+        <p:style>
+          <a:lnRef idx="1">
+            <a:schemeClr val="accent1"/>
+          </a:lnRef>
+          <a:fillRef idx="0">
+            <a:schemeClr val="accent1"/>
+          </a:fillRef>
+          <a:effectRef idx="0">
+            <a:schemeClr val="accent1"/>
+          </a:effectRef>
+          <a:fontRef idx="minor">
+            <a:schemeClr val="tx1"/>
+          </a:fontRef>
+        </p:style>
+      </p:cxnSp>
+      <p:sp>
+        <p:nvSpPr>
+          <p:cNvPr id="54" name="Oval 53"/>
+          <p:cNvSpPr/>
+          <p:nvPr/>
+        </p:nvSpPr>
+        <p:spPr>
+          <a:xfrm flipH="1">
+            <a:off x="5638800" y="5043268"/>
+            <a:ext cx="658017" cy="634181"/>
+          </a:xfrm>
+          <a:prstGeom prst="ellipse">
+            <a:avLst/>
+          </a:prstGeom>
+          <a:solidFill>
+            <a:schemeClr val="bg1"/>
+          </a:solidFill>
+          <a:ln>
+            <a:solidFill>
+              <a:schemeClr val="tx1"/>
+            </a:solidFill>
+          </a:ln>
+        </p:spPr>
+        <p:style>
+          <a:lnRef idx="2">
+            <a:schemeClr val="accent1">
+              <a:shade val="50000"/>
+            </a:schemeClr>
+          </a:lnRef>
+          <a:fillRef idx="1">
+            <a:schemeClr val="accent1"/>
+          </a:fillRef>
+          <a:effectRef idx="0">
+            <a:schemeClr val="accent1"/>
+          </a:effectRef>
+          <a:fontRef idx="minor">
+            <a:schemeClr val="lt1"/>
+          </a:fontRef>
+        </p:style>
+        <p:txBody>
+          <a:bodyPr rtlCol="0" anchor="ctr"/>
+          <a:lstStyle/>
+          <a:p>
+            <a:pPr algn="ctr"/>
+            <a:r>
+              <a:rPr lang="en-US" sz="3600" dirty="0">
+                <a:solidFill>
+                  <a:schemeClr val="tx1"/>
+                </a:solidFill>
+              </a:rPr>
+              <a:t>t</a:t>
+            </a:r>
+          </a:p>
+        </p:txBody>
+      </p:sp>
+      <p:sp>
+        <p:nvSpPr>
+          <p:cNvPr id="55" name="Oval 54"/>
+          <p:cNvSpPr/>
+          <p:nvPr/>
+        </p:nvSpPr>
+        <p:spPr>
+          <a:xfrm flipH="1">
+            <a:off x="5590383" y="4043099"/>
+            <a:ext cx="658017" cy="634181"/>
+          </a:xfrm>
+          <a:prstGeom prst="ellipse">
+            <a:avLst/>
+          </a:prstGeom>
+          <a:solidFill>
+            <a:schemeClr val="bg1"/>
+          </a:solidFill>
+          <a:ln>
+            <a:solidFill>
+              <a:schemeClr val="tx1"/>
+            </a:solidFill>
+          </a:ln>
+        </p:spPr>
+        <p:style>
+          <a:lnRef idx="2">
+            <a:schemeClr val="accent1">
+              <a:shade val="50000"/>
+            </a:schemeClr>
+          </a:lnRef>
+          <a:fillRef idx="1">
+            <a:schemeClr val="accent1"/>
+          </a:fillRef>
+          <a:effectRef idx="0">
+            <a:schemeClr val="accent1"/>
+          </a:effectRef>
+          <a:fontRef idx="minor">
+            <a:schemeClr val="lt1"/>
+          </a:fontRef>
+        </p:style>
+        <p:txBody>
+          <a:bodyPr rtlCol="0" anchor="ctr"/>
+          <a:lstStyle/>
+          <a:p>
+            <a:pPr algn="ctr"/>
+            <a:r>
+              <a:rPr lang="en-US" sz="3600" dirty="0" smtClean="0">
+                <a:solidFill>
+                  <a:schemeClr val="tx1"/>
+                </a:solidFill>
+              </a:rPr>
+              <a:t>x</a:t>
+            </a:r>
+            <a:endParaRPr lang="en-US" sz="3600" dirty="0">
               <a:solidFill>
                 <a:schemeClr val="tx1"/>
               </a:solidFill>
-            </a:ln>
-          </p:spPr>
-          <p:style>
-            <a:lnRef idx="1">
-              <a:schemeClr val="accent1"/>
-            </a:lnRef>
-            <a:fillRef idx="0">
-              <a:schemeClr val="accent1"/>
-            </a:fillRef>
-            <a:effectRef idx="0">
-              <a:schemeClr val="accent1"/>
-            </a:effectRef>
-            <a:fontRef idx="minor">
-              <a:schemeClr val="tx1"/>
-            </a:fontRef>
-          </p:style>
-        </p:cxnSp>
-      </p:grpSp>
+            </a:endParaRPr>
+          </a:p>
+        </p:txBody>
+      </p:sp>
     </p:spTree>
   </p:cSld>
   <p:clrMapOvr>
@@ -5276,6 +5353,2030 @@
   <p:clrMapOvr>
     <a:masterClrMapping/>
   </p:clrMapOvr>
+  <p:timing>
+    <p:tnLst>
+      <p:par>
+        <p:cTn id="1" dur="indefinite" restart="never" nodeType="tmRoot"/>
+      </p:par>
+    </p:tnLst>
+  </p:timing>
+</p:sld>
+</file>
+
+<file path=ppt/slides/slide3.xml><?xml version="1.0" encoding="utf-8"?>
+<p:sld xmlns:a="http://schemas.openxmlformats.org/drawingml/2006/main" xmlns:r="http://schemas.openxmlformats.org/officeDocument/2006/relationships" xmlns:p="http://schemas.openxmlformats.org/presentationml/2006/main">
+  <p:cSld>
+    <p:spTree>
+      <p:nvGrpSpPr>
+        <p:cNvPr id="1" name=""/>
+        <p:cNvGrpSpPr/>
+        <p:nvPr/>
+      </p:nvGrpSpPr>
+      <p:grpSpPr>
+        <a:xfrm>
+          <a:off x="0" y="0"/>
+          <a:ext cx="0" cy="0"/>
+          <a:chOff x="0" y="0"/>
+          <a:chExt cx="0" cy="0"/>
+        </a:xfrm>
+      </p:grpSpPr>
+      <p:cxnSp>
+        <p:nvCxnSpPr>
+          <p:cNvPr id="44" name="Straight Connector 43"/>
+          <p:cNvCxnSpPr>
+            <a:stCxn id="6" idx="4"/>
+          </p:cNvCxnSpPr>
+          <p:nvPr/>
+        </p:nvCxnSpPr>
+        <p:spPr>
+          <a:xfrm>
+            <a:off x="1853009" y="3605981"/>
+            <a:ext cx="0" cy="1920240"/>
+          </a:xfrm>
+          <a:prstGeom prst="line">
+            <a:avLst/>
+          </a:prstGeom>
+          <a:ln w="28575">
+            <a:solidFill>
+              <a:schemeClr val="tx1"/>
+            </a:solidFill>
+          </a:ln>
+        </p:spPr>
+        <p:style>
+          <a:lnRef idx="1">
+            <a:schemeClr val="accent1"/>
+          </a:lnRef>
+          <a:fillRef idx="0">
+            <a:schemeClr val="accent1"/>
+          </a:fillRef>
+          <a:effectRef idx="0">
+            <a:schemeClr val="accent1"/>
+          </a:effectRef>
+          <a:fontRef idx="minor">
+            <a:schemeClr val="tx1"/>
+          </a:fontRef>
+        </p:style>
+      </p:cxnSp>
+      <p:grpSp>
+        <p:nvGrpSpPr>
+          <p:cNvPr id="2" name="Group 78"/>
+          <p:cNvGrpSpPr/>
+          <p:nvPr/>
+        </p:nvGrpSpPr>
+        <p:grpSpPr>
+          <a:xfrm>
+            <a:off x="1169808" y="76200"/>
+            <a:ext cx="5697659" cy="5610124"/>
+            <a:chOff x="1752598" y="-838200"/>
+            <a:chExt cx="5938233" cy="6066761"/>
+          </a:xfrm>
+        </p:grpSpPr>
+        <p:cxnSp>
+          <p:nvCxnSpPr>
+            <p:cNvPr id="68" name="Straight Connector 67"/>
+            <p:cNvCxnSpPr/>
+            <p:nvPr/>
+          </p:nvCxnSpPr>
+          <p:spPr>
+            <a:xfrm flipH="1">
+              <a:off x="4027762" y="1981200"/>
+              <a:ext cx="849038" cy="723900"/>
+            </a:xfrm>
+            <a:prstGeom prst="line">
+              <a:avLst/>
+            </a:prstGeom>
+            <a:ln w="28575">
+              <a:solidFill>
+                <a:schemeClr val="tx1"/>
+              </a:solidFill>
+            </a:ln>
+          </p:spPr>
+          <p:style>
+            <a:lnRef idx="1">
+              <a:schemeClr val="accent1"/>
+            </a:lnRef>
+            <a:fillRef idx="0">
+              <a:schemeClr val="accent1"/>
+            </a:fillRef>
+            <a:effectRef idx="0">
+              <a:schemeClr val="accent1"/>
+            </a:effectRef>
+            <a:fontRef idx="minor">
+              <a:schemeClr val="tx1"/>
+            </a:fontRef>
+          </p:style>
+        </p:cxnSp>
+        <p:cxnSp>
+          <p:nvCxnSpPr>
+            <p:cNvPr id="70" name="Straight Connector 69"/>
+            <p:cNvCxnSpPr/>
+            <p:nvPr/>
+          </p:nvCxnSpPr>
+          <p:spPr>
+            <a:xfrm>
+              <a:off x="4136503" y="2705099"/>
+              <a:ext cx="0" cy="2274304"/>
+            </a:xfrm>
+            <a:prstGeom prst="line">
+              <a:avLst/>
+            </a:prstGeom>
+            <a:ln w="28575">
+              <a:solidFill>
+                <a:schemeClr val="tx1"/>
+              </a:solidFill>
+            </a:ln>
+          </p:spPr>
+          <p:style>
+            <a:lnRef idx="1">
+              <a:schemeClr val="accent1"/>
+            </a:lnRef>
+            <a:fillRef idx="0">
+              <a:schemeClr val="accent1"/>
+            </a:fillRef>
+            <a:effectRef idx="0">
+              <a:schemeClr val="accent1"/>
+            </a:effectRef>
+            <a:fontRef idx="minor">
+              <a:schemeClr val="tx1"/>
+            </a:fontRef>
+          </p:style>
+        </p:cxnSp>
+        <p:cxnSp>
+          <p:nvCxnSpPr>
+            <p:cNvPr id="73" name="Straight Connector 72"/>
+            <p:cNvCxnSpPr>
+              <a:stCxn id="4" idx="5"/>
+            </p:cNvCxnSpPr>
+            <p:nvPr/>
+          </p:nvCxnSpPr>
+          <p:spPr>
+            <a:xfrm>
+              <a:off x="4623966" y="1042567"/>
+              <a:ext cx="1389230" cy="1580131"/>
+            </a:xfrm>
+            <a:prstGeom prst="line">
+              <a:avLst/>
+            </a:prstGeom>
+            <a:ln w="28575">
+              <a:solidFill>
+                <a:schemeClr val="tx1"/>
+              </a:solidFill>
+            </a:ln>
+          </p:spPr>
+          <p:style>
+            <a:lnRef idx="1">
+              <a:schemeClr val="accent1"/>
+            </a:lnRef>
+            <a:fillRef idx="0">
+              <a:schemeClr val="accent1"/>
+            </a:fillRef>
+            <a:effectRef idx="0">
+              <a:schemeClr val="accent1"/>
+            </a:effectRef>
+            <a:fontRef idx="minor">
+              <a:schemeClr val="tx1"/>
+            </a:fontRef>
+          </p:style>
+        </p:cxnSp>
+        <p:cxnSp>
+          <p:nvCxnSpPr>
+            <p:cNvPr id="75" name="Straight Connector 74"/>
+            <p:cNvCxnSpPr/>
+            <p:nvPr/>
+          </p:nvCxnSpPr>
+          <p:spPr>
+            <a:xfrm flipH="1">
+              <a:off x="5334000" y="2819400"/>
+              <a:ext cx="457200" cy="1219200"/>
+            </a:xfrm>
+            <a:prstGeom prst="line">
+              <a:avLst/>
+            </a:prstGeom>
+            <a:ln w="28575">
+              <a:solidFill>
+                <a:schemeClr val="tx1"/>
+              </a:solidFill>
+            </a:ln>
+          </p:spPr>
+          <p:style>
+            <a:lnRef idx="1">
+              <a:schemeClr val="accent1"/>
+            </a:lnRef>
+            <a:fillRef idx="0">
+              <a:schemeClr val="accent1"/>
+            </a:fillRef>
+            <a:effectRef idx="0">
+              <a:schemeClr val="accent1"/>
+            </a:effectRef>
+            <a:fontRef idx="minor">
+              <a:schemeClr val="tx1"/>
+            </a:fontRef>
+          </p:style>
+        </p:cxnSp>
+        <p:cxnSp>
+          <p:nvCxnSpPr>
+            <p:cNvPr id="77" name="Straight Connector 76"/>
+            <p:cNvCxnSpPr/>
+            <p:nvPr/>
+          </p:nvCxnSpPr>
+          <p:spPr>
+            <a:xfrm>
+              <a:off x="5334000" y="4038600"/>
+              <a:ext cx="0" cy="1143000"/>
+            </a:xfrm>
+            <a:prstGeom prst="line">
+              <a:avLst/>
+            </a:prstGeom>
+            <a:ln w="28575">
+              <a:solidFill>
+                <a:schemeClr val="tx1"/>
+              </a:solidFill>
+            </a:ln>
+          </p:spPr>
+          <p:style>
+            <a:lnRef idx="1">
+              <a:schemeClr val="accent1"/>
+            </a:lnRef>
+            <a:fillRef idx="0">
+              <a:schemeClr val="accent1"/>
+            </a:fillRef>
+            <a:effectRef idx="0">
+              <a:schemeClr val="accent1"/>
+            </a:effectRef>
+            <a:fontRef idx="minor">
+              <a:schemeClr val="tx1"/>
+            </a:fontRef>
+          </p:style>
+        </p:cxnSp>
+        <p:cxnSp>
+          <p:nvCxnSpPr>
+            <p:cNvPr id="52" name="Straight Connector 51"/>
+            <p:cNvCxnSpPr/>
+            <p:nvPr/>
+          </p:nvCxnSpPr>
+          <p:spPr>
+            <a:xfrm flipH="1">
+              <a:off x="2439416" y="1066800"/>
+              <a:ext cx="1751585" cy="1555898"/>
+            </a:xfrm>
+            <a:prstGeom prst="line">
+              <a:avLst/>
+            </a:prstGeom>
+            <a:ln w="28575">
+              <a:solidFill>
+                <a:schemeClr val="tx1"/>
+              </a:solidFill>
+            </a:ln>
+          </p:spPr>
+          <p:style>
+            <a:lnRef idx="1">
+              <a:schemeClr val="accent1"/>
+            </a:lnRef>
+            <a:fillRef idx="0">
+              <a:schemeClr val="accent1"/>
+            </a:fillRef>
+            <a:effectRef idx="0">
+              <a:schemeClr val="accent1"/>
+            </a:effectRef>
+            <a:fontRef idx="minor">
+              <a:schemeClr val="tx1"/>
+            </a:fontRef>
+          </p:style>
+        </p:cxnSp>
+        <p:sp>
+          <p:nvSpPr>
+            <p:cNvPr id="4" name="Oval 3"/>
+            <p:cNvSpPr/>
+            <p:nvPr/>
+          </p:nvSpPr>
+          <p:spPr>
+            <a:xfrm>
+              <a:off x="4038600" y="457200"/>
+              <a:ext cx="685800" cy="685800"/>
+            </a:xfrm>
+            <a:prstGeom prst="ellipse">
+              <a:avLst/>
+            </a:prstGeom>
+            <a:solidFill>
+              <a:schemeClr val="bg1">
+                <a:lumMod val="65000"/>
+              </a:schemeClr>
+            </a:solidFill>
+            <a:ln>
+              <a:solidFill>
+                <a:schemeClr val="tx1"/>
+              </a:solidFill>
+            </a:ln>
+          </p:spPr>
+          <p:style>
+            <a:lnRef idx="2">
+              <a:schemeClr val="accent1">
+                <a:shade val="50000"/>
+              </a:schemeClr>
+            </a:lnRef>
+            <a:fillRef idx="1">
+              <a:schemeClr val="accent1"/>
+            </a:fillRef>
+            <a:effectRef idx="0">
+              <a:schemeClr val="accent1"/>
+            </a:effectRef>
+            <a:fontRef idx="minor">
+              <a:schemeClr val="lt1"/>
+            </a:fontRef>
+          </p:style>
+          <p:txBody>
+            <a:bodyPr rtlCol="0" anchor="ctr"/>
+            <a:lstStyle/>
+            <a:p>
+              <a:pPr algn="ctr"/>
+              <a:endParaRPr lang="en-US"/>
+            </a:p>
+          </p:txBody>
+        </p:sp>
+        <p:sp>
+          <p:nvSpPr>
+            <p:cNvPr id="5" name="Oval 4"/>
+            <p:cNvSpPr/>
+            <p:nvPr/>
+          </p:nvSpPr>
+          <p:spPr>
+            <a:xfrm>
+              <a:off x="2995338" y="1469065"/>
+              <a:ext cx="685800" cy="685800"/>
+            </a:xfrm>
+            <a:prstGeom prst="ellipse">
+              <a:avLst/>
+            </a:prstGeom>
+            <a:solidFill>
+              <a:schemeClr val="bg1"/>
+            </a:solidFill>
+            <a:ln>
+              <a:solidFill>
+                <a:schemeClr val="tx1"/>
+              </a:solidFill>
+            </a:ln>
+          </p:spPr>
+          <p:style>
+            <a:lnRef idx="2">
+              <a:schemeClr val="accent1">
+                <a:shade val="50000"/>
+              </a:schemeClr>
+            </a:lnRef>
+            <a:fillRef idx="1">
+              <a:schemeClr val="accent1"/>
+            </a:fillRef>
+            <a:effectRef idx="0">
+              <a:schemeClr val="accent1"/>
+            </a:effectRef>
+            <a:fontRef idx="minor">
+              <a:schemeClr val="lt1"/>
+            </a:fontRef>
+          </p:style>
+          <p:txBody>
+            <a:bodyPr rtlCol="0" anchor="ctr"/>
+            <a:lstStyle/>
+            <a:p>
+              <a:pPr algn="ctr"/>
+              <a:r>
+                <a:rPr lang="en-US" sz="3600" dirty="0">
+                  <a:solidFill>
+                    <a:schemeClr val="tx1"/>
+                  </a:solidFill>
+                </a:rPr>
+                <a:t>s</a:t>
+              </a:r>
+            </a:p>
+          </p:txBody>
+        </p:sp>
+        <p:sp>
+          <p:nvSpPr>
+            <p:cNvPr id="6" name="Oval 5"/>
+            <p:cNvSpPr/>
+            <p:nvPr/>
+          </p:nvSpPr>
+          <p:spPr>
+            <a:xfrm>
+              <a:off x="2121747" y="2293088"/>
+              <a:ext cx="685800" cy="685800"/>
+            </a:xfrm>
+            <a:prstGeom prst="ellipse">
+              <a:avLst/>
+            </a:prstGeom>
+            <a:solidFill>
+              <a:schemeClr val="bg1"/>
+            </a:solidFill>
+            <a:ln>
+              <a:solidFill>
+                <a:schemeClr val="tx1"/>
+              </a:solidFill>
+            </a:ln>
+          </p:spPr>
+          <p:style>
+            <a:lnRef idx="2">
+              <a:schemeClr val="accent1">
+                <a:shade val="50000"/>
+              </a:schemeClr>
+            </a:lnRef>
+            <a:fillRef idx="1">
+              <a:schemeClr val="accent1"/>
+            </a:fillRef>
+            <a:effectRef idx="0">
+              <a:schemeClr val="accent1"/>
+            </a:effectRef>
+            <a:fontRef idx="minor">
+              <a:schemeClr val="lt1"/>
+            </a:fontRef>
+          </p:style>
+          <p:txBody>
+            <a:bodyPr rtlCol="0" anchor="ctr"/>
+            <a:lstStyle/>
+            <a:p>
+              <a:pPr algn="ctr"/>
+              <a:r>
+                <a:rPr lang="en-US" sz="3600" dirty="0">
+                  <a:solidFill>
+                    <a:schemeClr val="tx1"/>
+                  </a:solidFill>
+                </a:rPr>
+                <a:t>h</a:t>
+              </a:r>
+            </a:p>
+          </p:txBody>
+        </p:sp>
+        <p:sp>
+          <p:nvSpPr>
+            <p:cNvPr id="7" name="Oval 6"/>
+            <p:cNvSpPr/>
+            <p:nvPr/>
+          </p:nvSpPr>
+          <p:spPr>
+            <a:xfrm>
+              <a:off x="2150701" y="4542761"/>
+              <a:ext cx="685800" cy="685800"/>
+            </a:xfrm>
+            <a:prstGeom prst="ellipse">
+              <a:avLst/>
+            </a:prstGeom>
+            <a:solidFill>
+              <a:schemeClr val="bg1"/>
+            </a:solidFill>
+            <a:ln>
+              <a:solidFill>
+                <a:schemeClr val="tx1"/>
+              </a:solidFill>
+            </a:ln>
+          </p:spPr>
+          <p:style>
+            <a:lnRef idx="2">
+              <a:schemeClr val="accent1">
+                <a:shade val="50000"/>
+              </a:schemeClr>
+            </a:lnRef>
+            <a:fillRef idx="1">
+              <a:schemeClr val="accent1"/>
+            </a:fillRef>
+            <a:effectRef idx="0">
+              <a:schemeClr val="accent1"/>
+            </a:effectRef>
+            <a:fontRef idx="minor">
+              <a:schemeClr val="lt1"/>
+            </a:fontRef>
+          </p:style>
+          <p:txBody>
+            <a:bodyPr rtlCol="0" anchor="ctr"/>
+            <a:lstStyle/>
+            <a:p>
+              <a:pPr algn="ctr"/>
+              <a:r>
+                <a:rPr lang="en-US" sz="3600" dirty="0">
+                  <a:solidFill>
+                    <a:schemeClr val="tx1"/>
+                  </a:solidFill>
+                </a:rPr>
+                <a:t>r</a:t>
+              </a:r>
+            </a:p>
+          </p:txBody>
+        </p:sp>
+        <p:sp>
+          <p:nvSpPr>
+            <p:cNvPr id="8" name="Oval 7"/>
+            <p:cNvSpPr/>
+            <p:nvPr/>
+          </p:nvSpPr>
+          <p:spPr>
+            <a:xfrm>
+              <a:off x="2150701" y="3475961"/>
+              <a:ext cx="685800" cy="685800"/>
+            </a:xfrm>
+            <a:prstGeom prst="ellipse">
+              <a:avLst/>
+            </a:prstGeom>
+            <a:solidFill>
+              <a:schemeClr val="bg1"/>
+            </a:solidFill>
+            <a:ln>
+              <a:solidFill>
+                <a:schemeClr val="tx1"/>
+              </a:solidFill>
+            </a:ln>
+          </p:spPr>
+          <p:style>
+            <a:lnRef idx="2">
+              <a:schemeClr val="accent1">
+                <a:shade val="50000"/>
+              </a:schemeClr>
+            </a:lnRef>
+            <a:fillRef idx="1">
+              <a:schemeClr val="accent1"/>
+            </a:fillRef>
+            <a:effectRef idx="0">
+              <a:schemeClr val="accent1"/>
+            </a:effectRef>
+            <a:fontRef idx="minor">
+              <a:schemeClr val="lt1"/>
+            </a:fontRef>
+          </p:style>
+          <p:txBody>
+            <a:bodyPr rtlCol="0" anchor="ctr"/>
+            <a:lstStyle/>
+            <a:p>
+              <a:pPr algn="ctr"/>
+              <a:r>
+                <a:rPr lang="en-US" sz="3600" dirty="0">
+                  <a:solidFill>
+                    <a:schemeClr val="tx1"/>
+                  </a:solidFill>
+                </a:rPr>
+                <a:t>o</a:t>
+              </a:r>
+            </a:p>
+          </p:txBody>
+        </p:sp>
+        <p:sp>
+          <p:nvSpPr>
+            <p:cNvPr id="12" name="Oval 11"/>
+            <p:cNvSpPr/>
+            <p:nvPr/>
+          </p:nvSpPr>
+          <p:spPr>
+            <a:xfrm>
+              <a:off x="4742517" y="1469065"/>
+              <a:ext cx="685800" cy="685800"/>
+            </a:xfrm>
+            <a:prstGeom prst="ellipse">
+              <a:avLst/>
+            </a:prstGeom>
+            <a:solidFill>
+              <a:schemeClr val="bg1"/>
+            </a:solidFill>
+            <a:ln>
+              <a:solidFill>
+                <a:schemeClr val="tx1"/>
+              </a:solidFill>
+            </a:ln>
+          </p:spPr>
+          <p:style>
+            <a:lnRef idx="2">
+              <a:schemeClr val="accent1">
+                <a:shade val="50000"/>
+              </a:schemeClr>
+            </a:lnRef>
+            <a:fillRef idx="1">
+              <a:schemeClr val="accent1"/>
+            </a:fillRef>
+            <a:effectRef idx="0">
+              <a:schemeClr val="accent1"/>
+            </a:effectRef>
+            <a:fontRef idx="minor">
+              <a:schemeClr val="lt1"/>
+            </a:fontRef>
+          </p:style>
+          <p:txBody>
+            <a:bodyPr rtlCol="0" anchor="ctr"/>
+            <a:lstStyle/>
+            <a:p>
+              <a:pPr algn="ctr"/>
+              <a:r>
+                <a:rPr lang="en-US" sz="3600" dirty="0" smtClean="0">
+                  <a:solidFill>
+                    <a:schemeClr val="tx1"/>
+                  </a:solidFill>
+                </a:rPr>
+                <a:t>t</a:t>
+              </a:r>
+              <a:endParaRPr lang="en-US" sz="3600" dirty="0">
+                <a:solidFill>
+                  <a:schemeClr val="tx1"/>
+                </a:solidFill>
+              </a:endParaRPr>
+            </a:p>
+          </p:txBody>
+        </p:sp>
+        <p:sp>
+          <p:nvSpPr>
+            <p:cNvPr id="13" name="Oval 12"/>
+            <p:cNvSpPr/>
+            <p:nvPr/>
+          </p:nvSpPr>
+          <p:spPr>
+            <a:xfrm>
+              <a:off x="3789510" y="2293088"/>
+              <a:ext cx="685800" cy="685800"/>
+            </a:xfrm>
+            <a:prstGeom prst="ellipse">
+              <a:avLst/>
+            </a:prstGeom>
+            <a:solidFill>
+              <a:schemeClr val="bg1"/>
+            </a:solidFill>
+            <a:ln>
+              <a:solidFill>
+                <a:schemeClr val="tx1"/>
+              </a:solidFill>
+            </a:ln>
+          </p:spPr>
+          <p:style>
+            <a:lnRef idx="2">
+              <a:schemeClr val="accent1">
+                <a:shade val="50000"/>
+              </a:schemeClr>
+            </a:lnRef>
+            <a:fillRef idx="1">
+              <a:schemeClr val="accent1"/>
+            </a:fillRef>
+            <a:effectRef idx="0">
+              <a:schemeClr val="accent1"/>
+            </a:effectRef>
+            <a:fontRef idx="minor">
+              <a:schemeClr val="lt1"/>
+            </a:fontRef>
+          </p:style>
+          <p:txBody>
+            <a:bodyPr rtlCol="0" anchor="ctr"/>
+            <a:lstStyle/>
+            <a:p>
+              <a:pPr algn="ctr"/>
+              <a:r>
+                <a:rPr lang="en-US" sz="3600" dirty="0" smtClean="0">
+                  <a:solidFill>
+                    <a:schemeClr val="tx1"/>
+                  </a:solidFill>
+                </a:rPr>
+                <a:t>w</a:t>
+              </a:r>
+              <a:endParaRPr lang="en-US" sz="3600" dirty="0">
+                <a:solidFill>
+                  <a:schemeClr val="tx1"/>
+                </a:solidFill>
+              </a:endParaRPr>
+            </a:p>
+          </p:txBody>
+        </p:sp>
+        <p:sp>
+          <p:nvSpPr>
+            <p:cNvPr id="14" name="Oval 13"/>
+            <p:cNvSpPr/>
+            <p:nvPr/>
+          </p:nvSpPr>
+          <p:spPr>
+            <a:xfrm>
+              <a:off x="3818466" y="3475961"/>
+              <a:ext cx="685800" cy="685800"/>
+            </a:xfrm>
+            <a:prstGeom prst="ellipse">
+              <a:avLst/>
+            </a:prstGeom>
+            <a:solidFill>
+              <a:schemeClr val="bg1"/>
+            </a:solidFill>
+            <a:ln>
+              <a:solidFill>
+                <a:schemeClr val="tx1"/>
+              </a:solidFill>
+            </a:ln>
+          </p:spPr>
+          <p:style>
+            <a:lnRef idx="2">
+              <a:schemeClr val="accent1">
+                <a:shade val="50000"/>
+              </a:schemeClr>
+            </a:lnRef>
+            <a:fillRef idx="1">
+              <a:schemeClr val="accent1"/>
+            </a:fillRef>
+            <a:effectRef idx="0">
+              <a:schemeClr val="accent1"/>
+            </a:effectRef>
+            <a:fontRef idx="minor">
+              <a:schemeClr val="lt1"/>
+            </a:fontRef>
+          </p:style>
+          <p:txBody>
+            <a:bodyPr rtlCol="0" anchor="ctr"/>
+            <a:lstStyle/>
+            <a:p>
+              <a:pPr algn="ctr"/>
+              <a:r>
+                <a:rPr lang="en-US" sz="3600" dirty="0" smtClean="0">
+                  <a:solidFill>
+                    <a:schemeClr val="tx1"/>
+                  </a:solidFill>
+                </a:rPr>
+                <a:t>e</a:t>
+              </a:r>
+              <a:endParaRPr lang="en-US" sz="3600" dirty="0">
+                <a:solidFill>
+                  <a:schemeClr val="tx1"/>
+                </a:solidFill>
+              </a:endParaRPr>
+            </a:p>
+          </p:txBody>
+        </p:sp>
+        <p:sp>
+          <p:nvSpPr>
+            <p:cNvPr id="16" name="Oval 15"/>
+            <p:cNvSpPr/>
+            <p:nvPr/>
+          </p:nvSpPr>
+          <p:spPr>
+            <a:xfrm>
+              <a:off x="3818466" y="4542761"/>
+              <a:ext cx="685800" cy="685800"/>
+            </a:xfrm>
+            <a:prstGeom prst="ellipse">
+              <a:avLst/>
+            </a:prstGeom>
+            <a:solidFill>
+              <a:schemeClr val="bg1"/>
+            </a:solidFill>
+            <a:ln>
+              <a:solidFill>
+                <a:schemeClr val="tx1"/>
+              </a:solidFill>
+            </a:ln>
+          </p:spPr>
+          <p:style>
+            <a:lnRef idx="2">
+              <a:schemeClr val="accent1">
+                <a:shade val="50000"/>
+              </a:schemeClr>
+            </a:lnRef>
+            <a:fillRef idx="1">
+              <a:schemeClr val="accent1"/>
+            </a:fillRef>
+            <a:effectRef idx="0">
+              <a:schemeClr val="accent1"/>
+            </a:effectRef>
+            <a:fontRef idx="minor">
+              <a:schemeClr val="lt1"/>
+            </a:fontRef>
+          </p:style>
+          <p:txBody>
+            <a:bodyPr rtlCol="0" anchor="ctr"/>
+            <a:lstStyle/>
+            <a:p>
+              <a:pPr algn="ctr"/>
+              <a:r>
+                <a:rPr lang="en-US" sz="3600" dirty="0" smtClean="0">
+                  <a:solidFill>
+                    <a:schemeClr val="tx1"/>
+                  </a:solidFill>
+                </a:rPr>
+                <a:t>e</a:t>
+              </a:r>
+              <a:endParaRPr lang="en-US" sz="3600" dirty="0">
+                <a:solidFill>
+                  <a:schemeClr val="tx1"/>
+                </a:solidFill>
+              </a:endParaRPr>
+            </a:p>
+          </p:txBody>
+        </p:sp>
+        <p:sp>
+          <p:nvSpPr>
+            <p:cNvPr id="17" name="Oval 16"/>
+            <p:cNvSpPr/>
+            <p:nvPr/>
+          </p:nvSpPr>
+          <p:spPr>
+            <a:xfrm>
+              <a:off x="5029198" y="4542761"/>
+              <a:ext cx="685800" cy="685800"/>
+            </a:xfrm>
+            <a:prstGeom prst="ellipse">
+              <a:avLst/>
+            </a:prstGeom>
+            <a:solidFill>
+              <a:schemeClr val="bg1"/>
+            </a:solidFill>
+            <a:ln>
+              <a:solidFill>
+                <a:schemeClr val="tx1"/>
+              </a:solidFill>
+            </a:ln>
+          </p:spPr>
+          <p:style>
+            <a:lnRef idx="2">
+              <a:schemeClr val="accent1">
+                <a:shade val="50000"/>
+              </a:schemeClr>
+            </a:lnRef>
+            <a:fillRef idx="1">
+              <a:schemeClr val="accent1"/>
+            </a:fillRef>
+            <a:effectRef idx="0">
+              <a:schemeClr val="accent1"/>
+            </a:effectRef>
+            <a:fontRef idx="minor">
+              <a:schemeClr val="lt1"/>
+            </a:fontRef>
+          </p:style>
+          <p:txBody>
+            <a:bodyPr rtlCol="0" anchor="ctr"/>
+            <a:lstStyle/>
+            <a:p>
+              <a:pPr algn="ctr"/>
+              <a:r>
+                <a:rPr lang="en-US" sz="3600" dirty="0">
+                  <a:solidFill>
+                    <a:schemeClr val="tx1"/>
+                  </a:solidFill>
+                </a:rPr>
+                <a:t>t</a:t>
+              </a:r>
+            </a:p>
+          </p:txBody>
+        </p:sp>
+        <p:sp>
+          <p:nvSpPr>
+            <p:cNvPr id="18" name="Oval 17"/>
+            <p:cNvSpPr/>
+            <p:nvPr/>
+          </p:nvSpPr>
+          <p:spPr>
+            <a:xfrm>
+              <a:off x="5029198" y="3475961"/>
+              <a:ext cx="685800" cy="685800"/>
+            </a:xfrm>
+            <a:prstGeom prst="ellipse">
+              <a:avLst/>
+            </a:prstGeom>
+            <a:solidFill>
+              <a:schemeClr val="bg1"/>
+            </a:solidFill>
+            <a:ln>
+              <a:solidFill>
+                <a:schemeClr val="tx1"/>
+              </a:solidFill>
+            </a:ln>
+          </p:spPr>
+          <p:style>
+            <a:lnRef idx="2">
+              <a:schemeClr val="accent1">
+                <a:shade val="50000"/>
+              </a:schemeClr>
+            </a:lnRef>
+            <a:fillRef idx="1">
+              <a:schemeClr val="accent1"/>
+            </a:fillRef>
+            <a:effectRef idx="0">
+              <a:schemeClr val="accent1"/>
+            </a:effectRef>
+            <a:fontRef idx="minor">
+              <a:schemeClr val="lt1"/>
+            </a:fontRef>
+          </p:style>
+          <p:txBody>
+            <a:bodyPr rtlCol="0" anchor="ctr"/>
+            <a:lstStyle/>
+            <a:p>
+              <a:pPr algn="ctr"/>
+              <a:r>
+                <a:rPr lang="en-US" sz="3600" dirty="0">
+                  <a:solidFill>
+                    <a:schemeClr val="tx1"/>
+                  </a:solidFill>
+                </a:rPr>
+                <a:t>s</a:t>
+              </a:r>
+            </a:p>
+          </p:txBody>
+        </p:sp>
+        <p:sp>
+          <p:nvSpPr>
+            <p:cNvPr id="19" name="Oval 18"/>
+            <p:cNvSpPr/>
+            <p:nvPr/>
+          </p:nvSpPr>
+          <p:spPr>
+            <a:xfrm>
+              <a:off x="5645065" y="2293088"/>
+              <a:ext cx="685800" cy="685800"/>
+            </a:xfrm>
+            <a:prstGeom prst="ellipse">
+              <a:avLst/>
+            </a:prstGeom>
+            <a:solidFill>
+              <a:schemeClr val="bg1"/>
+            </a:solidFill>
+            <a:ln>
+              <a:solidFill>
+                <a:schemeClr val="tx1"/>
+              </a:solidFill>
+            </a:ln>
+          </p:spPr>
+          <p:style>
+            <a:lnRef idx="2">
+              <a:schemeClr val="accent1">
+                <a:shade val="50000"/>
+              </a:schemeClr>
+            </a:lnRef>
+            <a:fillRef idx="1">
+              <a:schemeClr val="accent1"/>
+            </a:fillRef>
+            <a:effectRef idx="0">
+              <a:schemeClr val="accent1"/>
+            </a:effectRef>
+            <a:fontRef idx="minor">
+              <a:schemeClr val="lt1"/>
+            </a:fontRef>
+          </p:style>
+          <p:txBody>
+            <a:bodyPr rtlCol="0" anchor="ctr"/>
+            <a:lstStyle/>
+            <a:p>
+              <a:pPr algn="ctr"/>
+              <a:r>
+                <a:rPr lang="en-US" sz="3600" dirty="0" smtClean="0">
+                  <a:solidFill>
+                    <a:schemeClr val="tx1"/>
+                  </a:solidFill>
+                </a:rPr>
+                <a:t>e</a:t>
+              </a:r>
+              <a:endParaRPr lang="en-US" sz="3600" dirty="0">
+                <a:solidFill>
+                  <a:schemeClr val="tx1"/>
+                </a:solidFill>
+              </a:endParaRPr>
+            </a:p>
+          </p:txBody>
+        </p:sp>
+        <p:sp>
+          <p:nvSpPr>
+            <p:cNvPr id="26" name="TextBox 25"/>
+            <p:cNvSpPr txBox="1"/>
+            <p:nvPr/>
+          </p:nvSpPr>
+          <p:spPr>
+            <a:xfrm>
+              <a:off x="3581400" y="-838200"/>
+              <a:ext cx="1976823" cy="1200329"/>
+            </a:xfrm>
+            <a:prstGeom prst="rect">
+              <a:avLst/>
+            </a:prstGeom>
+            <a:noFill/>
+          </p:spPr>
+          <p:txBody>
+            <a:bodyPr wrap="none" rtlCol="0">
+              <a:spAutoFit/>
+            </a:bodyPr>
+            <a:lstStyle/>
+            <a:p>
+              <a:r>
+                <a:rPr lang="en-US" dirty="0">
+                  <a:latin typeface="Courier New" pitchFamily="49" charset="0"/>
+                  <a:cs typeface="Courier New" pitchFamily="49" charset="0"/>
+                </a:rPr>
+                <a:t>i</a:t>
+              </a:r>
+              <a:r>
+                <a:rPr lang="en-US" dirty="0" smtClean="0">
+                  <a:latin typeface="Courier New" pitchFamily="49" charset="0"/>
+                  <a:cs typeface="Courier New" pitchFamily="49" charset="0"/>
+                </a:rPr>
+                <a:t>d: 0</a:t>
+              </a:r>
+            </a:p>
+            <a:p>
+              <a:r>
+                <a:rPr lang="en-US" dirty="0">
+                  <a:latin typeface="Courier New" pitchFamily="49" charset="0"/>
+                  <a:cs typeface="Courier New" pitchFamily="49" charset="0"/>
+                </a:rPr>
+                <a:t>c</a:t>
+              </a:r>
+              <a:r>
+                <a:rPr lang="en-US" dirty="0" smtClean="0">
+                  <a:latin typeface="Courier New" pitchFamily="49" charset="0"/>
+                  <a:cs typeface="Courier New" pitchFamily="49" charset="0"/>
+                </a:rPr>
+                <a:t>har: ‘’</a:t>
+              </a:r>
+            </a:p>
+            <a:p>
+              <a:r>
+                <a:rPr lang="en-US" dirty="0" err="1" smtClean="0">
+                  <a:latin typeface="Courier New" pitchFamily="49" charset="0"/>
+                  <a:cs typeface="Courier New" pitchFamily="49" charset="0"/>
+                </a:rPr>
+                <a:t>parent_id</a:t>
+              </a:r>
+              <a:r>
+                <a:rPr lang="en-US" dirty="0" smtClean="0">
+                  <a:latin typeface="Courier New" pitchFamily="49" charset="0"/>
+                  <a:cs typeface="Courier New" pitchFamily="49" charset="0"/>
+                </a:rPr>
+                <a:t>: -1</a:t>
+              </a:r>
+            </a:p>
+            <a:p>
+              <a:r>
+                <a:rPr lang="en-US" dirty="0" err="1" smtClean="0">
+                  <a:latin typeface="Courier New" pitchFamily="49" charset="0"/>
+                  <a:cs typeface="Courier New" pitchFamily="49" charset="0"/>
+                </a:rPr>
+                <a:t>docIds</a:t>
+              </a:r>
+              <a:r>
+                <a:rPr lang="en-US" dirty="0" smtClean="0">
+                  <a:latin typeface="Courier New" pitchFamily="49" charset="0"/>
+                  <a:cs typeface="Courier New" pitchFamily="49" charset="0"/>
+                </a:rPr>
+                <a:t>: []</a:t>
+              </a:r>
+              <a:endParaRPr lang="en-US" dirty="0">
+                <a:latin typeface="Courier New" pitchFamily="49" charset="0"/>
+                <a:cs typeface="Courier New" pitchFamily="49" charset="0"/>
+              </a:endParaRPr>
+            </a:p>
+          </p:txBody>
+        </p:sp>
+        <p:sp>
+          <p:nvSpPr>
+            <p:cNvPr id="28" name="TextBox 27"/>
+            <p:cNvSpPr txBox="1"/>
+            <p:nvPr/>
+          </p:nvSpPr>
+          <p:spPr>
+            <a:xfrm>
+              <a:off x="5486861" y="727444"/>
+              <a:ext cx="2203970" cy="1298030"/>
+            </a:xfrm>
+            <a:prstGeom prst="rect">
+              <a:avLst/>
+            </a:prstGeom>
+            <a:noFill/>
+          </p:spPr>
+          <p:txBody>
+            <a:bodyPr wrap="none" rtlCol="0">
+              <a:spAutoFit/>
+            </a:bodyPr>
+            <a:lstStyle/>
+            <a:p>
+              <a:r>
+                <a:rPr lang="en-US" dirty="0">
+                  <a:latin typeface="Courier New" pitchFamily="49" charset="0"/>
+                  <a:cs typeface="Courier New" pitchFamily="49" charset="0"/>
+                </a:rPr>
+                <a:t>i</a:t>
+              </a:r>
+              <a:r>
+                <a:rPr lang="en-US" dirty="0" smtClean="0">
+                  <a:latin typeface="Courier New" pitchFamily="49" charset="0"/>
+                  <a:cs typeface="Courier New" pitchFamily="49" charset="0"/>
+                </a:rPr>
+                <a:t>d: </a:t>
+              </a:r>
+              <a:r>
+                <a:rPr lang="en-US" dirty="0" smtClean="0">
+                  <a:latin typeface="Courier New" pitchFamily="49" charset="0"/>
+                  <a:cs typeface="Courier New" pitchFamily="49" charset="0"/>
+                </a:rPr>
+                <a:t>5</a:t>
+              </a:r>
+              <a:endParaRPr lang="en-US" dirty="0" smtClean="0">
+                <a:latin typeface="Courier New" pitchFamily="49" charset="0"/>
+                <a:cs typeface="Courier New" pitchFamily="49" charset="0"/>
+              </a:endParaRPr>
+            </a:p>
+            <a:p>
+              <a:r>
+                <a:rPr lang="en-US" dirty="0">
+                  <a:latin typeface="Courier New" pitchFamily="49" charset="0"/>
+                  <a:cs typeface="Courier New" pitchFamily="49" charset="0"/>
+                </a:rPr>
+                <a:t>c</a:t>
+              </a:r>
+              <a:r>
+                <a:rPr lang="en-US" dirty="0" smtClean="0">
+                  <a:latin typeface="Courier New" pitchFamily="49" charset="0"/>
+                  <a:cs typeface="Courier New" pitchFamily="49" charset="0"/>
+                </a:rPr>
+                <a:t>har: ‘t’</a:t>
+              </a:r>
+            </a:p>
+            <a:p>
+              <a:r>
+                <a:rPr lang="en-US" dirty="0" err="1" smtClean="0">
+                  <a:latin typeface="Courier New" pitchFamily="49" charset="0"/>
+                  <a:cs typeface="Courier New" pitchFamily="49" charset="0"/>
+                </a:rPr>
+                <a:t>parent_id</a:t>
+              </a:r>
+              <a:r>
+                <a:rPr lang="en-US" dirty="0" smtClean="0">
+                  <a:latin typeface="Courier New" pitchFamily="49" charset="0"/>
+                  <a:cs typeface="Courier New" pitchFamily="49" charset="0"/>
+                </a:rPr>
+                <a:t>: 0</a:t>
+              </a:r>
+            </a:p>
+            <a:p>
+              <a:r>
+                <a:rPr lang="en-US" dirty="0" err="1" smtClean="0">
+                  <a:latin typeface="Courier New" pitchFamily="49" charset="0"/>
+                  <a:cs typeface="Courier New" pitchFamily="49" charset="0"/>
+                </a:rPr>
+                <a:t>docIds</a:t>
+              </a:r>
+              <a:r>
+                <a:rPr lang="en-US" dirty="0" smtClean="0">
+                  <a:latin typeface="Courier New" pitchFamily="49" charset="0"/>
+                  <a:cs typeface="Courier New" pitchFamily="49" charset="0"/>
+                </a:rPr>
+                <a:t>: [1, 2]</a:t>
+              </a:r>
+              <a:endParaRPr lang="en-US" dirty="0">
+                <a:latin typeface="Courier New" pitchFamily="49" charset="0"/>
+                <a:cs typeface="Courier New" pitchFamily="49" charset="0"/>
+              </a:endParaRPr>
+            </a:p>
+          </p:txBody>
+        </p:sp>
+        <p:sp>
+          <p:nvSpPr>
+            <p:cNvPr id="30" name="TextBox 29"/>
+            <p:cNvSpPr txBox="1"/>
+            <p:nvPr/>
+          </p:nvSpPr>
+          <p:spPr>
+            <a:xfrm>
+              <a:off x="1752598" y="2418170"/>
+              <a:ext cx="322524" cy="369332"/>
+            </a:xfrm>
+            <a:prstGeom prst="rect">
+              <a:avLst/>
+            </a:prstGeom>
+            <a:noFill/>
+          </p:spPr>
+          <p:txBody>
+            <a:bodyPr wrap="none" rtlCol="0">
+              <a:spAutoFit/>
+            </a:bodyPr>
+            <a:lstStyle/>
+            <a:p>
+              <a:r>
+                <a:rPr lang="en-US" dirty="0" smtClean="0">
+                  <a:latin typeface="Courier New" pitchFamily="49" charset="0"/>
+                  <a:cs typeface="Courier New" pitchFamily="49" charset="0"/>
+                </a:rPr>
+                <a:t>2</a:t>
+              </a:r>
+              <a:endParaRPr lang="en-US" dirty="0">
+                <a:latin typeface="Courier New" pitchFamily="49" charset="0"/>
+                <a:cs typeface="Courier New" pitchFamily="49" charset="0"/>
+              </a:endParaRPr>
+            </a:p>
+          </p:txBody>
+        </p:sp>
+        <p:sp>
+          <p:nvSpPr>
+            <p:cNvPr id="31" name="TextBox 30"/>
+            <p:cNvSpPr txBox="1"/>
+            <p:nvPr/>
+          </p:nvSpPr>
+          <p:spPr>
+            <a:xfrm>
+              <a:off x="1752598" y="3571803"/>
+              <a:ext cx="322524" cy="369332"/>
+            </a:xfrm>
+            <a:prstGeom prst="rect">
+              <a:avLst/>
+            </a:prstGeom>
+            <a:noFill/>
+          </p:spPr>
+          <p:txBody>
+            <a:bodyPr wrap="none" rtlCol="0">
+              <a:spAutoFit/>
+            </a:bodyPr>
+            <a:lstStyle/>
+            <a:p>
+              <a:r>
+                <a:rPr lang="en-US" dirty="0" smtClean="0">
+                  <a:latin typeface="Courier New" pitchFamily="49" charset="0"/>
+                  <a:cs typeface="Courier New" pitchFamily="49" charset="0"/>
+                </a:rPr>
+                <a:t>3</a:t>
+              </a:r>
+              <a:endParaRPr lang="en-US" dirty="0">
+                <a:latin typeface="Courier New" pitchFamily="49" charset="0"/>
+                <a:cs typeface="Courier New" pitchFamily="49" charset="0"/>
+              </a:endParaRPr>
+            </a:p>
+          </p:txBody>
+        </p:sp>
+        <p:sp>
+          <p:nvSpPr>
+            <p:cNvPr id="34" name="TextBox 33"/>
+            <p:cNvSpPr txBox="1"/>
+            <p:nvPr/>
+          </p:nvSpPr>
+          <p:spPr>
+            <a:xfrm>
+              <a:off x="4484958" y="2418170"/>
+              <a:ext cx="336142" cy="399394"/>
+            </a:xfrm>
+            <a:prstGeom prst="rect">
+              <a:avLst/>
+            </a:prstGeom>
+            <a:noFill/>
+          </p:spPr>
+          <p:txBody>
+            <a:bodyPr wrap="none" rtlCol="0">
+              <a:spAutoFit/>
+            </a:bodyPr>
+            <a:lstStyle/>
+            <a:p>
+              <a:r>
+                <a:rPr lang="en-US" dirty="0" smtClean="0">
+                  <a:latin typeface="Courier New" pitchFamily="49" charset="0"/>
+                  <a:cs typeface="Courier New" pitchFamily="49" charset="0"/>
+                </a:rPr>
+                <a:t>6</a:t>
+              </a:r>
+              <a:endParaRPr lang="en-US" dirty="0">
+                <a:latin typeface="Courier New" pitchFamily="49" charset="0"/>
+                <a:cs typeface="Courier New" pitchFamily="49" charset="0"/>
+              </a:endParaRPr>
+            </a:p>
+          </p:txBody>
+        </p:sp>
+        <p:sp>
+          <p:nvSpPr>
+            <p:cNvPr id="35" name="TextBox 34"/>
+            <p:cNvSpPr txBox="1"/>
+            <p:nvPr/>
+          </p:nvSpPr>
+          <p:spPr>
+            <a:xfrm>
+              <a:off x="4484958" y="3571802"/>
+              <a:ext cx="336142" cy="399394"/>
+            </a:xfrm>
+            <a:prstGeom prst="rect">
+              <a:avLst/>
+            </a:prstGeom>
+            <a:noFill/>
+          </p:spPr>
+          <p:txBody>
+            <a:bodyPr wrap="none" rtlCol="0">
+              <a:spAutoFit/>
+            </a:bodyPr>
+            <a:lstStyle/>
+            <a:p>
+              <a:r>
+                <a:rPr lang="en-US" dirty="0" smtClean="0">
+                  <a:latin typeface="Courier New" pitchFamily="49" charset="0"/>
+                  <a:cs typeface="Courier New" pitchFamily="49" charset="0"/>
+                </a:rPr>
+                <a:t>7</a:t>
+              </a:r>
+              <a:endParaRPr lang="en-US" dirty="0">
+                <a:latin typeface="Courier New" pitchFamily="49" charset="0"/>
+                <a:cs typeface="Courier New" pitchFamily="49" charset="0"/>
+              </a:endParaRPr>
+            </a:p>
+          </p:txBody>
+        </p:sp>
+        <p:sp>
+          <p:nvSpPr>
+            <p:cNvPr id="38" name="TextBox 37"/>
+            <p:cNvSpPr txBox="1"/>
+            <p:nvPr/>
+          </p:nvSpPr>
+          <p:spPr>
+            <a:xfrm>
+              <a:off x="6346990" y="2418170"/>
+              <a:ext cx="336142" cy="399394"/>
+            </a:xfrm>
+            <a:prstGeom prst="rect">
+              <a:avLst/>
+            </a:prstGeom>
+            <a:noFill/>
+          </p:spPr>
+          <p:txBody>
+            <a:bodyPr wrap="none" rtlCol="0">
+              <a:spAutoFit/>
+            </a:bodyPr>
+            <a:lstStyle/>
+            <a:p>
+              <a:r>
+                <a:rPr lang="en-US" dirty="0" smtClean="0">
+                  <a:latin typeface="Courier New" pitchFamily="49" charset="0"/>
+                  <a:cs typeface="Courier New" pitchFamily="49" charset="0"/>
+                </a:rPr>
+                <a:t>9</a:t>
+              </a:r>
+              <a:endParaRPr lang="en-US" dirty="0">
+                <a:latin typeface="Courier New" pitchFamily="49" charset="0"/>
+                <a:cs typeface="Courier New" pitchFamily="49" charset="0"/>
+              </a:endParaRPr>
+            </a:p>
+          </p:txBody>
+        </p:sp>
+        <p:sp>
+          <p:nvSpPr>
+            <p:cNvPr id="39" name="TextBox 38"/>
+            <p:cNvSpPr txBox="1"/>
+            <p:nvPr/>
+          </p:nvSpPr>
+          <p:spPr>
+            <a:xfrm>
+              <a:off x="5697751" y="3571802"/>
+              <a:ext cx="479821" cy="399394"/>
+            </a:xfrm>
+            <a:prstGeom prst="rect">
+              <a:avLst/>
+            </a:prstGeom>
+            <a:noFill/>
+          </p:spPr>
+          <p:txBody>
+            <a:bodyPr wrap="none" rtlCol="0">
+              <a:spAutoFit/>
+            </a:bodyPr>
+            <a:lstStyle/>
+            <a:p>
+              <a:r>
+                <a:rPr lang="en-US" dirty="0" smtClean="0">
+                  <a:latin typeface="Courier New" pitchFamily="49" charset="0"/>
+                  <a:cs typeface="Courier New" pitchFamily="49" charset="0"/>
+                </a:rPr>
+                <a:t>10</a:t>
+              </a:r>
+              <a:endParaRPr lang="en-US" dirty="0">
+                <a:latin typeface="Courier New" pitchFamily="49" charset="0"/>
+                <a:cs typeface="Courier New" pitchFamily="49" charset="0"/>
+              </a:endParaRPr>
+            </a:p>
+          </p:txBody>
+        </p:sp>
+        <p:sp>
+          <p:nvSpPr>
+            <p:cNvPr id="40" name="TextBox 39"/>
+            <p:cNvSpPr txBox="1"/>
+            <p:nvPr/>
+          </p:nvSpPr>
+          <p:spPr>
+            <a:xfrm>
+              <a:off x="5697751" y="4598213"/>
+              <a:ext cx="479821" cy="399394"/>
+            </a:xfrm>
+            <a:prstGeom prst="rect">
+              <a:avLst/>
+            </a:prstGeom>
+            <a:noFill/>
+          </p:spPr>
+          <p:txBody>
+            <a:bodyPr wrap="none" rtlCol="0">
+              <a:spAutoFit/>
+            </a:bodyPr>
+            <a:lstStyle/>
+            <a:p>
+              <a:r>
+                <a:rPr lang="en-US" dirty="0" smtClean="0">
+                  <a:latin typeface="Courier New" pitchFamily="49" charset="0"/>
+                  <a:cs typeface="Courier New" pitchFamily="49" charset="0"/>
+                </a:rPr>
+                <a:t>11</a:t>
+              </a:r>
+              <a:endParaRPr lang="en-US" dirty="0">
+                <a:latin typeface="Courier New" pitchFamily="49" charset="0"/>
+                <a:cs typeface="Courier New" pitchFamily="49" charset="0"/>
+              </a:endParaRPr>
+            </a:p>
+          </p:txBody>
+        </p:sp>
+        <p:sp>
+          <p:nvSpPr>
+            <p:cNvPr id="41" name="TextBox 40"/>
+            <p:cNvSpPr txBox="1"/>
+            <p:nvPr/>
+          </p:nvSpPr>
+          <p:spPr>
+            <a:xfrm>
+              <a:off x="7007220" y="3571802"/>
+              <a:ext cx="479821" cy="399394"/>
+            </a:xfrm>
+            <a:prstGeom prst="rect">
+              <a:avLst/>
+            </a:prstGeom>
+            <a:noFill/>
+          </p:spPr>
+          <p:txBody>
+            <a:bodyPr wrap="none" rtlCol="0">
+              <a:spAutoFit/>
+            </a:bodyPr>
+            <a:lstStyle/>
+            <a:p>
+              <a:r>
+                <a:rPr lang="en-US" dirty="0" smtClean="0">
+                  <a:latin typeface="Courier New" pitchFamily="49" charset="0"/>
+                  <a:cs typeface="Courier New" pitchFamily="49" charset="0"/>
+                </a:rPr>
+                <a:t>12</a:t>
+              </a:r>
+              <a:endParaRPr lang="en-US" dirty="0">
+                <a:latin typeface="Courier New" pitchFamily="49" charset="0"/>
+                <a:cs typeface="Courier New" pitchFamily="49" charset="0"/>
+              </a:endParaRPr>
+            </a:p>
+          </p:txBody>
+        </p:sp>
+      </p:grpSp>
+      <p:cxnSp>
+        <p:nvCxnSpPr>
+          <p:cNvPr id="51" name="Straight Connector 50"/>
+          <p:cNvCxnSpPr/>
+          <p:nvPr/>
+        </p:nvCxnSpPr>
+        <p:spPr>
+          <a:xfrm>
+            <a:off x="5517270" y="3462996"/>
+            <a:ext cx="438678" cy="1127432"/>
+          </a:xfrm>
+          <a:prstGeom prst="line">
+            <a:avLst/>
+          </a:prstGeom>
+          <a:ln w="28575">
+            <a:solidFill>
+              <a:schemeClr val="tx1"/>
+            </a:solidFill>
+          </a:ln>
+        </p:spPr>
+        <p:style>
+          <a:lnRef idx="1">
+            <a:schemeClr val="accent1"/>
+          </a:lnRef>
+          <a:fillRef idx="0">
+            <a:schemeClr val="accent1"/>
+          </a:fillRef>
+          <a:effectRef idx="0">
+            <a:schemeClr val="accent1"/>
+          </a:effectRef>
+          <a:fontRef idx="minor">
+            <a:schemeClr val="tx1"/>
+          </a:fontRef>
+        </p:style>
+      </p:cxnSp>
+      <p:cxnSp>
+        <p:nvCxnSpPr>
+          <p:cNvPr id="53" name="Straight Connector 52"/>
+          <p:cNvCxnSpPr/>
+          <p:nvPr/>
+        </p:nvCxnSpPr>
+        <p:spPr>
+          <a:xfrm flipH="1">
+            <a:off x="5955948" y="4590428"/>
+            <a:ext cx="0" cy="1056968"/>
+          </a:xfrm>
+          <a:prstGeom prst="line">
+            <a:avLst/>
+          </a:prstGeom>
+          <a:ln w="28575">
+            <a:solidFill>
+              <a:schemeClr val="tx1"/>
+            </a:solidFill>
+          </a:ln>
+        </p:spPr>
+        <p:style>
+          <a:lnRef idx="1">
+            <a:schemeClr val="accent1"/>
+          </a:lnRef>
+          <a:fillRef idx="0">
+            <a:schemeClr val="accent1"/>
+          </a:fillRef>
+          <a:effectRef idx="0">
+            <a:schemeClr val="accent1"/>
+          </a:effectRef>
+          <a:fontRef idx="minor">
+            <a:schemeClr val="tx1"/>
+          </a:fontRef>
+        </p:style>
+      </p:cxnSp>
+      <p:sp>
+        <p:nvSpPr>
+          <p:cNvPr id="54" name="Oval 53"/>
+          <p:cNvSpPr/>
+          <p:nvPr/>
+        </p:nvSpPr>
+        <p:spPr>
+          <a:xfrm flipH="1">
+            <a:off x="5638800" y="5043268"/>
+            <a:ext cx="658017" cy="634181"/>
+          </a:xfrm>
+          <a:prstGeom prst="ellipse">
+            <a:avLst/>
+          </a:prstGeom>
+          <a:solidFill>
+            <a:schemeClr val="bg1"/>
+          </a:solidFill>
+          <a:ln>
+            <a:solidFill>
+              <a:schemeClr val="tx1"/>
+            </a:solidFill>
+          </a:ln>
+        </p:spPr>
+        <p:style>
+          <a:lnRef idx="2">
+            <a:schemeClr val="accent1">
+              <a:shade val="50000"/>
+            </a:schemeClr>
+          </a:lnRef>
+          <a:fillRef idx="1">
+            <a:schemeClr val="accent1"/>
+          </a:fillRef>
+          <a:effectRef idx="0">
+            <a:schemeClr val="accent1"/>
+          </a:effectRef>
+          <a:fontRef idx="minor">
+            <a:schemeClr val="lt1"/>
+          </a:fontRef>
+        </p:style>
+        <p:txBody>
+          <a:bodyPr rtlCol="0" anchor="ctr"/>
+          <a:lstStyle/>
+          <a:p>
+            <a:pPr algn="ctr"/>
+            <a:r>
+              <a:rPr lang="en-US" sz="3600" dirty="0">
+                <a:solidFill>
+                  <a:schemeClr val="tx1"/>
+                </a:solidFill>
+              </a:rPr>
+              <a:t>t</a:t>
+            </a:r>
+          </a:p>
+        </p:txBody>
+      </p:sp>
+      <p:sp>
+        <p:nvSpPr>
+          <p:cNvPr id="55" name="Oval 54"/>
+          <p:cNvSpPr/>
+          <p:nvPr/>
+        </p:nvSpPr>
+        <p:spPr>
+          <a:xfrm flipH="1">
+            <a:off x="5590383" y="4043099"/>
+            <a:ext cx="658017" cy="634181"/>
+          </a:xfrm>
+          <a:prstGeom prst="ellipse">
+            <a:avLst/>
+          </a:prstGeom>
+          <a:solidFill>
+            <a:schemeClr val="bg1"/>
+          </a:solidFill>
+          <a:ln>
+            <a:solidFill>
+              <a:schemeClr val="tx1"/>
+            </a:solidFill>
+          </a:ln>
+        </p:spPr>
+        <p:style>
+          <a:lnRef idx="2">
+            <a:schemeClr val="accent1">
+              <a:shade val="50000"/>
+            </a:schemeClr>
+          </a:lnRef>
+          <a:fillRef idx="1">
+            <a:schemeClr val="accent1"/>
+          </a:fillRef>
+          <a:effectRef idx="0">
+            <a:schemeClr val="accent1"/>
+          </a:effectRef>
+          <a:fontRef idx="minor">
+            <a:schemeClr val="lt1"/>
+          </a:fontRef>
+        </p:style>
+        <p:txBody>
+          <a:bodyPr rtlCol="0" anchor="ctr"/>
+          <a:lstStyle/>
+          <a:p>
+            <a:pPr algn="ctr"/>
+            <a:r>
+              <a:rPr lang="en-US" sz="3600" dirty="0" smtClean="0">
+                <a:solidFill>
+                  <a:schemeClr val="tx1"/>
+                </a:solidFill>
+              </a:rPr>
+              <a:t>x</a:t>
+            </a:r>
+            <a:endParaRPr lang="en-US" sz="3600" dirty="0">
+              <a:solidFill>
+                <a:schemeClr val="tx1"/>
+              </a:solidFill>
+            </a:endParaRPr>
+          </a:p>
+        </p:txBody>
+      </p:sp>
+      <p:sp>
+        <p:nvSpPr>
+          <p:cNvPr id="45" name="TextBox 44"/>
+          <p:cNvSpPr txBox="1"/>
+          <p:nvPr/>
+        </p:nvSpPr>
+        <p:spPr>
+          <a:xfrm>
+            <a:off x="228600" y="5181600"/>
+            <a:ext cx="2819400" cy="1200329"/>
+          </a:xfrm>
+          <a:prstGeom prst="rect">
+            <a:avLst/>
+          </a:prstGeom>
+          <a:noFill/>
+        </p:spPr>
+        <p:txBody>
+          <a:bodyPr wrap="square" rtlCol="0">
+            <a:spAutoFit/>
+          </a:bodyPr>
+          <a:lstStyle/>
+          <a:p>
+            <a:r>
+              <a:rPr lang="en-US" dirty="0">
+                <a:latin typeface="Courier New" pitchFamily="49" charset="0"/>
+                <a:cs typeface="Courier New" pitchFamily="49" charset="0"/>
+              </a:rPr>
+              <a:t>i</a:t>
+            </a:r>
+            <a:r>
+              <a:rPr lang="en-US" dirty="0" smtClean="0">
+                <a:latin typeface="Courier New" pitchFamily="49" charset="0"/>
+                <a:cs typeface="Courier New" pitchFamily="49" charset="0"/>
+              </a:rPr>
+              <a:t>d: </a:t>
+            </a:r>
+            <a:r>
+              <a:rPr lang="en-US" dirty="0" smtClean="0">
+                <a:latin typeface="Courier New" pitchFamily="49" charset="0"/>
+                <a:cs typeface="Courier New" pitchFamily="49" charset="0"/>
+              </a:rPr>
+              <a:t>4</a:t>
+            </a:r>
+            <a:endParaRPr lang="en-US" dirty="0" smtClean="0">
+              <a:latin typeface="Courier New" pitchFamily="49" charset="0"/>
+              <a:cs typeface="Courier New" pitchFamily="49" charset="0"/>
+            </a:endParaRPr>
+          </a:p>
+          <a:p>
+            <a:r>
+              <a:rPr lang="en-US" dirty="0">
+                <a:latin typeface="Courier New" pitchFamily="49" charset="0"/>
+                <a:cs typeface="Courier New" pitchFamily="49" charset="0"/>
+              </a:rPr>
+              <a:t>c</a:t>
+            </a:r>
+            <a:r>
+              <a:rPr lang="en-US" dirty="0" smtClean="0">
+                <a:latin typeface="Courier New" pitchFamily="49" charset="0"/>
+                <a:cs typeface="Courier New" pitchFamily="49" charset="0"/>
+              </a:rPr>
+              <a:t>har: </a:t>
+            </a:r>
+            <a:r>
+              <a:rPr lang="en-US" dirty="0" smtClean="0">
+                <a:latin typeface="Courier New" pitchFamily="49" charset="0"/>
+                <a:cs typeface="Courier New" pitchFamily="49" charset="0"/>
+              </a:rPr>
+              <a:t>‘r’</a:t>
+            </a:r>
+            <a:endParaRPr lang="en-US" dirty="0" smtClean="0">
+              <a:latin typeface="Courier New" pitchFamily="49" charset="0"/>
+              <a:cs typeface="Courier New" pitchFamily="49" charset="0"/>
+            </a:endParaRPr>
+          </a:p>
+          <a:p>
+            <a:r>
+              <a:rPr lang="en-US" dirty="0" err="1" smtClean="0">
+                <a:latin typeface="Courier New" pitchFamily="49" charset="0"/>
+                <a:cs typeface="Courier New" pitchFamily="49" charset="0"/>
+              </a:rPr>
+              <a:t>parent_id</a:t>
+            </a:r>
+            <a:r>
+              <a:rPr lang="en-US" dirty="0" smtClean="0">
+                <a:latin typeface="Courier New" pitchFamily="49" charset="0"/>
+                <a:cs typeface="Courier New" pitchFamily="49" charset="0"/>
+              </a:rPr>
+              <a:t>: </a:t>
+            </a:r>
+            <a:r>
+              <a:rPr lang="en-US" dirty="0" smtClean="0">
+                <a:latin typeface="Courier New" pitchFamily="49" charset="0"/>
+                <a:cs typeface="Courier New" pitchFamily="49" charset="0"/>
+              </a:rPr>
+              <a:t>3</a:t>
+            </a:r>
+            <a:endParaRPr lang="en-US" dirty="0" smtClean="0">
+              <a:latin typeface="Courier New" pitchFamily="49" charset="0"/>
+              <a:cs typeface="Courier New" pitchFamily="49" charset="0"/>
+            </a:endParaRPr>
+          </a:p>
+          <a:p>
+            <a:r>
+              <a:rPr lang="en-US" dirty="0" err="1" smtClean="0">
+                <a:latin typeface="Courier New" pitchFamily="49" charset="0"/>
+                <a:cs typeface="Courier New" pitchFamily="49" charset="0"/>
+              </a:rPr>
+              <a:t>wordMap</a:t>
+            </a:r>
+            <a:r>
+              <a:rPr lang="en-US" dirty="0" smtClean="0">
+                <a:latin typeface="Courier New" pitchFamily="49" charset="0"/>
+                <a:cs typeface="Courier New" pitchFamily="49" charset="0"/>
+              </a:rPr>
+              <a:t>: {‘t’:[1]}</a:t>
+            </a:r>
+            <a:endParaRPr lang="en-US" dirty="0">
+              <a:latin typeface="Courier New" pitchFamily="49" charset="0"/>
+              <a:cs typeface="Courier New" pitchFamily="49" charset="0"/>
+            </a:endParaRPr>
+          </a:p>
+        </p:txBody>
+      </p:sp>
+      <p:sp>
+        <p:nvSpPr>
+          <p:cNvPr id="46" name="TextBox 45"/>
+          <p:cNvSpPr txBox="1"/>
+          <p:nvPr/>
+        </p:nvSpPr>
+        <p:spPr>
+          <a:xfrm>
+            <a:off x="685800" y="1328418"/>
+            <a:ext cx="1764465" cy="1109982"/>
+          </a:xfrm>
+          <a:prstGeom prst="rect">
+            <a:avLst/>
+          </a:prstGeom>
+          <a:noFill/>
+        </p:spPr>
+        <p:txBody>
+          <a:bodyPr wrap="none" rtlCol="0">
+            <a:spAutoFit/>
+          </a:bodyPr>
+          <a:lstStyle/>
+          <a:p>
+            <a:r>
+              <a:rPr lang="en-US" dirty="0">
+                <a:latin typeface="Courier New" pitchFamily="49" charset="0"/>
+                <a:cs typeface="Courier New" pitchFamily="49" charset="0"/>
+              </a:rPr>
+              <a:t>i</a:t>
+            </a:r>
+            <a:r>
+              <a:rPr lang="en-US" dirty="0" smtClean="0">
+                <a:latin typeface="Courier New" pitchFamily="49" charset="0"/>
+                <a:cs typeface="Courier New" pitchFamily="49" charset="0"/>
+              </a:rPr>
+              <a:t>d: 1</a:t>
+            </a:r>
+          </a:p>
+          <a:p>
+            <a:r>
+              <a:rPr lang="en-US" dirty="0">
+                <a:latin typeface="Courier New" pitchFamily="49" charset="0"/>
+                <a:cs typeface="Courier New" pitchFamily="49" charset="0"/>
+              </a:rPr>
+              <a:t>c</a:t>
+            </a:r>
+            <a:r>
+              <a:rPr lang="en-US" dirty="0" smtClean="0">
+                <a:latin typeface="Courier New" pitchFamily="49" charset="0"/>
+                <a:cs typeface="Courier New" pitchFamily="49" charset="0"/>
+              </a:rPr>
+              <a:t>har: ‘s’</a:t>
+            </a:r>
+          </a:p>
+          <a:p>
+            <a:r>
+              <a:rPr lang="en-US" dirty="0" err="1" smtClean="0">
+                <a:latin typeface="Courier New" pitchFamily="49" charset="0"/>
+                <a:cs typeface="Courier New" pitchFamily="49" charset="0"/>
+              </a:rPr>
+              <a:t>parent_id</a:t>
+            </a:r>
+            <a:r>
+              <a:rPr lang="en-US" dirty="0" smtClean="0">
+                <a:latin typeface="Courier New" pitchFamily="49" charset="0"/>
+                <a:cs typeface="Courier New" pitchFamily="49" charset="0"/>
+              </a:rPr>
+              <a:t>: 0</a:t>
+            </a:r>
+          </a:p>
+          <a:p>
+            <a:r>
+              <a:rPr lang="en-US" dirty="0" err="1" smtClean="0">
+                <a:latin typeface="Courier New" pitchFamily="49" charset="0"/>
+                <a:cs typeface="Courier New" pitchFamily="49" charset="0"/>
+              </a:rPr>
+              <a:t>docIds</a:t>
+            </a:r>
+            <a:r>
+              <a:rPr lang="en-US" dirty="0" smtClean="0">
+                <a:latin typeface="Courier New" pitchFamily="49" charset="0"/>
+                <a:cs typeface="Courier New" pitchFamily="49" charset="0"/>
+              </a:rPr>
+              <a:t>: [1]</a:t>
+            </a:r>
+            <a:endParaRPr lang="en-US" dirty="0">
+              <a:latin typeface="Courier New" pitchFamily="49" charset="0"/>
+              <a:cs typeface="Courier New" pitchFamily="49" charset="0"/>
+            </a:endParaRPr>
+          </a:p>
+        </p:txBody>
+      </p:sp>
+      <p:sp>
+        <p:nvSpPr>
+          <p:cNvPr id="47" name="TextBox 46"/>
+          <p:cNvSpPr txBox="1"/>
+          <p:nvPr/>
+        </p:nvSpPr>
+        <p:spPr>
+          <a:xfrm>
+            <a:off x="3197794" y="5657671"/>
+            <a:ext cx="3355406" cy="1200329"/>
+          </a:xfrm>
+          <a:prstGeom prst="rect">
+            <a:avLst/>
+          </a:prstGeom>
+          <a:noFill/>
+        </p:spPr>
+        <p:txBody>
+          <a:bodyPr wrap="square" rtlCol="0">
+            <a:spAutoFit/>
+          </a:bodyPr>
+          <a:lstStyle/>
+          <a:p>
+            <a:r>
+              <a:rPr lang="en-US" dirty="0">
+                <a:latin typeface="Courier New" pitchFamily="49" charset="0"/>
+                <a:cs typeface="Courier New" pitchFamily="49" charset="0"/>
+              </a:rPr>
+              <a:t>i</a:t>
+            </a:r>
+            <a:r>
+              <a:rPr lang="en-US" dirty="0" smtClean="0">
+                <a:latin typeface="Courier New" pitchFamily="49" charset="0"/>
+                <a:cs typeface="Courier New" pitchFamily="49" charset="0"/>
+              </a:rPr>
+              <a:t>d: </a:t>
+            </a:r>
+            <a:r>
+              <a:rPr lang="en-US" dirty="0" smtClean="0">
+                <a:latin typeface="Courier New" pitchFamily="49" charset="0"/>
+                <a:cs typeface="Courier New" pitchFamily="49" charset="0"/>
+              </a:rPr>
+              <a:t>8</a:t>
+            </a:r>
+            <a:endParaRPr lang="en-US" dirty="0" smtClean="0">
+              <a:latin typeface="Courier New" pitchFamily="49" charset="0"/>
+              <a:cs typeface="Courier New" pitchFamily="49" charset="0"/>
+            </a:endParaRPr>
+          </a:p>
+          <a:p>
+            <a:r>
+              <a:rPr lang="en-US" dirty="0">
+                <a:latin typeface="Courier New" pitchFamily="49" charset="0"/>
+                <a:cs typeface="Courier New" pitchFamily="49" charset="0"/>
+              </a:rPr>
+              <a:t>c</a:t>
+            </a:r>
+            <a:r>
+              <a:rPr lang="en-US" dirty="0" smtClean="0">
+                <a:latin typeface="Courier New" pitchFamily="49" charset="0"/>
+                <a:cs typeface="Courier New" pitchFamily="49" charset="0"/>
+              </a:rPr>
+              <a:t>har: </a:t>
+            </a:r>
+            <a:r>
+              <a:rPr lang="en-US" dirty="0" smtClean="0">
+                <a:latin typeface="Courier New" pitchFamily="49" charset="0"/>
+                <a:cs typeface="Courier New" pitchFamily="49" charset="0"/>
+              </a:rPr>
+              <a:t>‘e’</a:t>
+            </a:r>
+            <a:endParaRPr lang="en-US" dirty="0" smtClean="0">
+              <a:latin typeface="Courier New" pitchFamily="49" charset="0"/>
+              <a:cs typeface="Courier New" pitchFamily="49" charset="0"/>
+            </a:endParaRPr>
+          </a:p>
+          <a:p>
+            <a:r>
+              <a:rPr lang="en-US" dirty="0" err="1" smtClean="0">
+                <a:latin typeface="Courier New" pitchFamily="49" charset="0"/>
+                <a:cs typeface="Courier New" pitchFamily="49" charset="0"/>
+              </a:rPr>
+              <a:t>parent_id</a:t>
+            </a:r>
+            <a:r>
+              <a:rPr lang="en-US" dirty="0" smtClean="0">
+                <a:latin typeface="Courier New" pitchFamily="49" charset="0"/>
+                <a:cs typeface="Courier New" pitchFamily="49" charset="0"/>
+              </a:rPr>
+              <a:t>: </a:t>
+            </a:r>
+            <a:r>
+              <a:rPr lang="en-US" dirty="0" smtClean="0">
+                <a:latin typeface="Courier New" pitchFamily="49" charset="0"/>
+                <a:cs typeface="Courier New" pitchFamily="49" charset="0"/>
+              </a:rPr>
+              <a:t>7</a:t>
+            </a:r>
+            <a:endParaRPr lang="en-US" dirty="0" smtClean="0">
+              <a:latin typeface="Courier New" pitchFamily="49" charset="0"/>
+              <a:cs typeface="Courier New" pitchFamily="49" charset="0"/>
+            </a:endParaRPr>
+          </a:p>
+          <a:p>
+            <a:r>
+              <a:rPr lang="en-US" dirty="0" err="1" smtClean="0">
+                <a:latin typeface="Courier New" pitchFamily="49" charset="0"/>
+                <a:cs typeface="Courier New" pitchFamily="49" charset="0"/>
+              </a:rPr>
+              <a:t>wordMap</a:t>
+            </a:r>
+            <a:r>
+              <a:rPr lang="en-US" dirty="0" smtClean="0">
+                <a:latin typeface="Courier New" pitchFamily="49" charset="0"/>
+                <a:cs typeface="Courier New" pitchFamily="49" charset="0"/>
+              </a:rPr>
+              <a:t>: {‘t’:[1]}</a:t>
+            </a:r>
+            <a:endParaRPr lang="en-US" dirty="0">
+              <a:latin typeface="Courier New" pitchFamily="49" charset="0"/>
+              <a:cs typeface="Courier New" pitchFamily="49" charset="0"/>
+            </a:endParaRPr>
+          </a:p>
+        </p:txBody>
+      </p:sp>
+      <p:sp>
+        <p:nvSpPr>
+          <p:cNvPr id="48" name="TextBox 47"/>
+          <p:cNvSpPr txBox="1"/>
+          <p:nvPr/>
+        </p:nvSpPr>
+        <p:spPr>
+          <a:xfrm>
+            <a:off x="6245218" y="5085472"/>
+            <a:ext cx="460382" cy="369332"/>
+          </a:xfrm>
+          <a:prstGeom prst="rect">
+            <a:avLst/>
+          </a:prstGeom>
+          <a:noFill/>
+        </p:spPr>
+        <p:txBody>
+          <a:bodyPr wrap="none" rtlCol="0">
+            <a:spAutoFit/>
+          </a:bodyPr>
+          <a:lstStyle/>
+          <a:p>
+            <a:r>
+              <a:rPr lang="en-US" dirty="0" smtClean="0">
+                <a:latin typeface="Courier New" pitchFamily="49" charset="0"/>
+                <a:cs typeface="Courier New" pitchFamily="49" charset="0"/>
+              </a:rPr>
+              <a:t>13</a:t>
+            </a:r>
+            <a:endParaRPr lang="en-US" dirty="0">
+              <a:latin typeface="Courier New" pitchFamily="49" charset="0"/>
+              <a:cs typeface="Courier New" pitchFamily="49" charset="0"/>
+            </a:endParaRPr>
+          </a:p>
+        </p:txBody>
+      </p:sp>
+    </p:spTree>
+  </p:cSld>
+  <p:clrMapOvr>
+    <a:masterClrMapping/>
+  </p:clrMapOvr>
+  <p:timing>
+    <p:tnLst>
+      <p:par>
+        <p:cTn id="1" dur="indefinite" restart="never" nodeType="tmRoot"/>
+      </p:par>
+    </p:tnLst>
+  </p:timing>
 </p:sld>
 </file>
 

</xml_diff>